<commit_message>
added data process, outlined methods
</commit_message>
<xml_diff>
--- a/ppt.pptx
+++ b/ppt.pptx
@@ -7,6 +7,7 @@
   <p:sldIdLst>
     <p:sldId id="256" r:id="rId2"/>
     <p:sldId id="258" r:id="rId3"/>
+    <p:sldId id="259" r:id="rId4"/>
   </p:sldIdLst>
   <p:sldSz cx="12192000" cy="6858000"/>
   <p:notesSz cx="6858000" cy="9144000"/>
@@ -105,10 +106,797 @@
       </a:defRPr>
     </a:lvl9pPr>
   </p:defaultTextStyle>
+  <p:extLst>
+    <p:ext uri="{EFAFB233-063F-42B5-8137-9DF3F51BA10A}">
+      <p15:sldGuideLst xmlns:p15="http://schemas.microsoft.com/office/powerpoint/2012/main"/>
+    </p:ext>
+  </p:extLst>
 </p:presentation>
 </file>
 
 <file path=ppt/diagrams/colors1.xml><?xml version="1.0" encoding="utf-8"?>
+<dgm:colorsDef xmlns:dgm="http://schemas.openxmlformats.org/drawingml/2006/diagram" xmlns:a="http://schemas.openxmlformats.org/drawingml/2006/main" uniqueId="urn:microsoft.com/office/officeart/2005/8/colors/colorful5">
+  <dgm:title val=""/>
+  <dgm:desc val=""/>
+  <dgm:catLst>
+    <dgm:cat type="colorful" pri="10500"/>
+  </dgm:catLst>
+  <dgm:styleLbl name="node0">
+    <dgm:fillClrLst meth="repeat">
+      <a:schemeClr val="accent4"/>
+    </dgm:fillClrLst>
+    <dgm:linClrLst meth="repeat">
+      <a:schemeClr val="lt1"/>
+    </dgm:linClrLst>
+    <dgm:effectClrLst/>
+    <dgm:txLinClrLst/>
+    <dgm:txFillClrLst/>
+    <dgm:txEffectClrLst/>
+  </dgm:styleLbl>
+  <dgm:styleLbl name="node1">
+    <dgm:fillClrLst>
+      <a:schemeClr val="accent5"/>
+      <a:schemeClr val="accent6"/>
+    </dgm:fillClrLst>
+    <dgm:linClrLst meth="repeat">
+      <a:schemeClr val="lt1"/>
+    </dgm:linClrLst>
+    <dgm:effectClrLst/>
+    <dgm:txLinClrLst/>
+    <dgm:txFillClrLst/>
+    <dgm:txEffectClrLst/>
+  </dgm:styleLbl>
+  <dgm:styleLbl name="alignNode1">
+    <dgm:fillClrLst>
+      <a:schemeClr val="accent5"/>
+      <a:schemeClr val="accent6"/>
+    </dgm:fillClrLst>
+    <dgm:linClrLst>
+      <a:schemeClr val="accent5"/>
+      <a:schemeClr val="accent6"/>
+    </dgm:linClrLst>
+    <dgm:effectClrLst/>
+    <dgm:txLinClrLst/>
+    <dgm:txFillClrLst/>
+    <dgm:txEffectClrLst/>
+  </dgm:styleLbl>
+  <dgm:styleLbl name="lnNode1">
+    <dgm:fillClrLst>
+      <a:schemeClr val="accent5"/>
+      <a:schemeClr val="accent6"/>
+    </dgm:fillClrLst>
+    <dgm:linClrLst meth="repeat">
+      <a:schemeClr val="lt1"/>
+    </dgm:linClrLst>
+    <dgm:effectClrLst/>
+    <dgm:txLinClrLst/>
+    <dgm:txFillClrLst/>
+    <dgm:txEffectClrLst/>
+  </dgm:styleLbl>
+  <dgm:styleLbl name="vennNode1">
+    <dgm:fillClrLst>
+      <a:schemeClr val="accent5">
+        <a:alpha val="50000"/>
+      </a:schemeClr>
+      <a:schemeClr val="accent6">
+        <a:alpha val="50000"/>
+      </a:schemeClr>
+    </dgm:fillClrLst>
+    <dgm:linClrLst meth="repeat">
+      <a:schemeClr val="lt1"/>
+    </dgm:linClrLst>
+    <dgm:effectClrLst/>
+    <dgm:txLinClrLst/>
+    <dgm:txFillClrLst/>
+    <dgm:txEffectClrLst/>
+  </dgm:styleLbl>
+  <dgm:styleLbl name="node2">
+    <dgm:fillClrLst>
+      <a:schemeClr val="accent6"/>
+    </dgm:fillClrLst>
+    <dgm:linClrLst meth="repeat">
+      <a:schemeClr val="lt1"/>
+    </dgm:linClrLst>
+    <dgm:effectClrLst/>
+    <dgm:txLinClrLst/>
+    <dgm:txFillClrLst/>
+    <dgm:txEffectClrLst/>
+  </dgm:styleLbl>
+  <dgm:styleLbl name="node3">
+    <dgm:fillClrLst>
+      <a:schemeClr val="accent1"/>
+    </dgm:fillClrLst>
+    <dgm:linClrLst meth="repeat">
+      <a:schemeClr val="lt1"/>
+    </dgm:linClrLst>
+    <dgm:effectClrLst/>
+    <dgm:txLinClrLst/>
+    <dgm:txFillClrLst/>
+    <dgm:txEffectClrLst/>
+  </dgm:styleLbl>
+  <dgm:styleLbl name="node4">
+    <dgm:fillClrLst>
+      <a:schemeClr val="accent2"/>
+    </dgm:fillClrLst>
+    <dgm:linClrLst meth="repeat">
+      <a:schemeClr val="lt1"/>
+    </dgm:linClrLst>
+    <dgm:effectClrLst/>
+    <dgm:txLinClrLst/>
+    <dgm:txFillClrLst/>
+    <dgm:txEffectClrLst/>
+  </dgm:styleLbl>
+  <dgm:styleLbl name="fgImgPlace1">
+    <dgm:fillClrLst>
+      <a:schemeClr val="accent5">
+        <a:tint val="50000"/>
+      </a:schemeClr>
+      <a:schemeClr val="accent6">
+        <a:tint val="50000"/>
+      </a:schemeClr>
+    </dgm:fillClrLst>
+    <dgm:linClrLst meth="repeat">
+      <a:schemeClr val="lt1"/>
+    </dgm:linClrLst>
+    <dgm:effectClrLst/>
+    <dgm:txLinClrLst/>
+    <dgm:txFillClrLst meth="repeat">
+      <a:schemeClr val="lt1"/>
+    </dgm:txFillClrLst>
+    <dgm:txEffectClrLst/>
+  </dgm:styleLbl>
+  <dgm:styleLbl name="alignImgPlace1">
+    <dgm:fillClrLst>
+      <a:schemeClr val="accent5">
+        <a:tint val="50000"/>
+      </a:schemeClr>
+      <a:schemeClr val="accent6">
+        <a:tint val="20000"/>
+      </a:schemeClr>
+    </dgm:fillClrLst>
+    <dgm:linClrLst meth="repeat">
+      <a:schemeClr val="lt1"/>
+    </dgm:linClrLst>
+    <dgm:effectClrLst/>
+    <dgm:txLinClrLst/>
+    <dgm:txFillClrLst meth="repeat">
+      <a:schemeClr val="lt1"/>
+    </dgm:txFillClrLst>
+    <dgm:txEffectClrLst/>
+  </dgm:styleLbl>
+  <dgm:styleLbl name="bgImgPlace1">
+    <dgm:fillClrLst>
+      <a:schemeClr val="accent5">
+        <a:tint val="50000"/>
+      </a:schemeClr>
+      <a:schemeClr val="accent6">
+        <a:tint val="20000"/>
+      </a:schemeClr>
+    </dgm:fillClrLst>
+    <dgm:linClrLst meth="repeat">
+      <a:schemeClr val="lt1"/>
+    </dgm:linClrLst>
+    <dgm:effectClrLst/>
+    <dgm:txLinClrLst/>
+    <dgm:txFillClrLst meth="repeat">
+      <a:schemeClr val="lt1"/>
+    </dgm:txFillClrLst>
+    <dgm:txEffectClrLst/>
+  </dgm:styleLbl>
+  <dgm:styleLbl name="sibTrans2D1">
+    <dgm:fillClrLst>
+      <a:schemeClr val="accent5"/>
+      <a:schemeClr val="accent6"/>
+    </dgm:fillClrLst>
+    <dgm:linClrLst meth="repeat">
+      <a:schemeClr val="lt1"/>
+    </dgm:linClrLst>
+    <dgm:effectClrLst/>
+    <dgm:txLinClrLst/>
+    <dgm:txFillClrLst/>
+    <dgm:txEffectClrLst/>
+  </dgm:styleLbl>
+  <dgm:styleLbl name="fgSibTrans2D1">
+    <dgm:fillClrLst>
+      <a:schemeClr val="accent5"/>
+      <a:schemeClr val="accent6"/>
+    </dgm:fillClrLst>
+    <dgm:linClrLst meth="repeat">
+      <a:schemeClr val="lt1"/>
+    </dgm:linClrLst>
+    <dgm:effectClrLst/>
+    <dgm:txLinClrLst/>
+    <dgm:txFillClrLst meth="repeat">
+      <a:schemeClr val="lt1"/>
+    </dgm:txFillClrLst>
+    <dgm:txEffectClrLst/>
+  </dgm:styleLbl>
+  <dgm:styleLbl name="bgSibTrans2D1">
+    <dgm:fillClrLst>
+      <a:schemeClr val="accent5"/>
+      <a:schemeClr val="accent6"/>
+    </dgm:fillClrLst>
+    <dgm:linClrLst meth="repeat">
+      <a:schemeClr val="lt1"/>
+    </dgm:linClrLst>
+    <dgm:effectClrLst/>
+    <dgm:txLinClrLst/>
+    <dgm:txFillClrLst meth="repeat">
+      <a:schemeClr val="lt1"/>
+    </dgm:txFillClrLst>
+    <dgm:txEffectClrLst/>
+  </dgm:styleLbl>
+  <dgm:styleLbl name="sibTrans1D1">
+    <dgm:fillClrLst/>
+    <dgm:linClrLst>
+      <a:schemeClr val="accent5"/>
+      <a:schemeClr val="accent6"/>
+    </dgm:linClrLst>
+    <dgm:effectClrLst/>
+    <dgm:txLinClrLst/>
+    <dgm:txFillClrLst meth="repeat">
+      <a:schemeClr val="tx1"/>
+    </dgm:txFillClrLst>
+    <dgm:txEffectClrLst/>
+  </dgm:styleLbl>
+  <dgm:styleLbl name="callout">
+    <dgm:fillClrLst meth="repeat">
+      <a:schemeClr val="accent5"/>
+    </dgm:fillClrLst>
+    <dgm:linClrLst meth="repeat">
+      <a:schemeClr val="accent5">
+        <a:tint val="50000"/>
+      </a:schemeClr>
+    </dgm:linClrLst>
+    <dgm:effectClrLst/>
+    <dgm:txLinClrLst/>
+    <dgm:txFillClrLst meth="repeat">
+      <a:schemeClr val="tx1"/>
+    </dgm:txFillClrLst>
+    <dgm:txEffectClrLst/>
+  </dgm:styleLbl>
+  <dgm:styleLbl name="asst0">
+    <dgm:fillClrLst meth="repeat">
+      <a:schemeClr val="accent5"/>
+    </dgm:fillClrLst>
+    <dgm:linClrLst meth="repeat">
+      <a:schemeClr val="lt1">
+        <a:shade val="80000"/>
+      </a:schemeClr>
+    </dgm:linClrLst>
+    <dgm:effectClrLst/>
+    <dgm:txLinClrLst/>
+    <dgm:txFillClrLst/>
+    <dgm:txEffectClrLst/>
+  </dgm:styleLbl>
+  <dgm:styleLbl name="asst1">
+    <dgm:fillClrLst meth="repeat">
+      <a:schemeClr val="accent6"/>
+    </dgm:fillClrLst>
+    <dgm:linClrLst meth="repeat">
+      <a:schemeClr val="lt1">
+        <a:shade val="80000"/>
+      </a:schemeClr>
+    </dgm:linClrLst>
+    <dgm:effectClrLst/>
+    <dgm:txLinClrLst/>
+    <dgm:txFillClrLst/>
+    <dgm:txEffectClrLst/>
+  </dgm:styleLbl>
+  <dgm:styleLbl name="asst2">
+    <dgm:fillClrLst>
+      <a:schemeClr val="accent1"/>
+    </dgm:fillClrLst>
+    <dgm:linClrLst meth="repeat">
+      <a:schemeClr val="lt1"/>
+    </dgm:linClrLst>
+    <dgm:effectClrLst/>
+    <dgm:txLinClrLst/>
+    <dgm:txFillClrLst/>
+    <dgm:txEffectClrLst/>
+  </dgm:styleLbl>
+  <dgm:styleLbl name="asst3">
+    <dgm:fillClrLst>
+      <a:schemeClr val="accent2"/>
+    </dgm:fillClrLst>
+    <dgm:linClrLst meth="repeat">
+      <a:schemeClr val="lt1"/>
+    </dgm:linClrLst>
+    <dgm:effectClrLst/>
+    <dgm:txLinClrLst/>
+    <dgm:txFillClrLst/>
+    <dgm:txEffectClrLst/>
+  </dgm:styleLbl>
+  <dgm:styleLbl name="asst4">
+    <dgm:fillClrLst>
+      <a:schemeClr val="accent3"/>
+    </dgm:fillClrLst>
+    <dgm:linClrLst meth="repeat">
+      <a:schemeClr val="lt1"/>
+    </dgm:linClrLst>
+    <dgm:effectClrLst/>
+    <dgm:txLinClrLst/>
+    <dgm:txFillClrLst/>
+    <dgm:txEffectClrLst/>
+  </dgm:styleLbl>
+  <dgm:styleLbl name="parChTrans2D1">
+    <dgm:fillClrLst meth="repeat">
+      <a:schemeClr val="accent5"/>
+    </dgm:fillClrLst>
+    <dgm:linClrLst meth="repeat">
+      <a:schemeClr val="lt1"/>
+    </dgm:linClrLst>
+    <dgm:effectClrLst/>
+    <dgm:txLinClrLst/>
+    <dgm:txFillClrLst meth="repeat">
+      <a:schemeClr val="lt1"/>
+    </dgm:txFillClrLst>
+    <dgm:txEffectClrLst/>
+  </dgm:styleLbl>
+  <dgm:styleLbl name="parChTrans2D2">
+    <dgm:fillClrLst meth="repeat">
+      <a:schemeClr val="accent6"/>
+    </dgm:fillClrLst>
+    <dgm:linClrLst meth="repeat">
+      <a:schemeClr val="lt1"/>
+    </dgm:linClrLst>
+    <dgm:effectClrLst/>
+    <dgm:txLinClrLst/>
+    <dgm:txFillClrLst/>
+    <dgm:txEffectClrLst/>
+  </dgm:styleLbl>
+  <dgm:styleLbl name="parChTrans2D3">
+    <dgm:fillClrLst meth="repeat">
+      <a:schemeClr val="accent6"/>
+    </dgm:fillClrLst>
+    <dgm:linClrLst meth="repeat">
+      <a:schemeClr val="lt1"/>
+    </dgm:linClrLst>
+    <dgm:effectClrLst/>
+    <dgm:txLinClrLst/>
+    <dgm:txFillClrLst/>
+    <dgm:txEffectClrLst/>
+  </dgm:styleLbl>
+  <dgm:styleLbl name="parChTrans2D4">
+    <dgm:fillClrLst meth="repeat">
+      <a:schemeClr val="accent1"/>
+    </dgm:fillClrLst>
+    <dgm:linClrLst meth="repeat">
+      <a:schemeClr val="lt1"/>
+    </dgm:linClrLst>
+    <dgm:effectClrLst/>
+    <dgm:txLinClrLst/>
+    <dgm:txFillClrLst meth="repeat">
+      <a:schemeClr val="lt1"/>
+    </dgm:txFillClrLst>
+    <dgm:txEffectClrLst/>
+  </dgm:styleLbl>
+  <dgm:styleLbl name="parChTrans1D1">
+    <dgm:fillClrLst meth="repeat">
+      <a:schemeClr val="accent5"/>
+    </dgm:fillClrLst>
+    <dgm:linClrLst meth="repeat">
+      <a:schemeClr val="accent5"/>
+    </dgm:linClrLst>
+    <dgm:effectClrLst/>
+    <dgm:txLinClrLst/>
+    <dgm:txFillClrLst meth="repeat">
+      <a:schemeClr val="tx1"/>
+    </dgm:txFillClrLst>
+    <dgm:txEffectClrLst/>
+  </dgm:styleLbl>
+  <dgm:styleLbl name="parChTrans1D2">
+    <dgm:fillClrLst meth="repeat">
+      <a:schemeClr val="accent6">
+        <a:tint val="90000"/>
+      </a:schemeClr>
+    </dgm:fillClrLst>
+    <dgm:linClrLst meth="repeat">
+      <a:schemeClr val="accent6"/>
+    </dgm:linClrLst>
+    <dgm:effectClrLst/>
+    <dgm:txLinClrLst/>
+    <dgm:txFillClrLst meth="repeat">
+      <a:schemeClr val="tx1"/>
+    </dgm:txFillClrLst>
+    <dgm:txEffectClrLst/>
+  </dgm:styleLbl>
+  <dgm:styleLbl name="parChTrans1D3">
+    <dgm:fillClrLst meth="repeat">
+      <a:schemeClr val="accent6">
+        <a:tint val="70000"/>
+      </a:schemeClr>
+    </dgm:fillClrLst>
+    <dgm:linClrLst meth="repeat">
+      <a:schemeClr val="accent1"/>
+    </dgm:linClrLst>
+    <dgm:effectClrLst/>
+    <dgm:txLinClrLst/>
+    <dgm:txFillClrLst meth="repeat">
+      <a:schemeClr val="tx1"/>
+    </dgm:txFillClrLst>
+    <dgm:txEffectClrLst/>
+  </dgm:styleLbl>
+  <dgm:styleLbl name="parChTrans1D4">
+    <dgm:fillClrLst meth="repeat">
+      <a:schemeClr val="accent6">
+        <a:tint val="50000"/>
+      </a:schemeClr>
+    </dgm:fillClrLst>
+    <dgm:linClrLst meth="repeat">
+      <a:schemeClr val="accent2"/>
+    </dgm:linClrLst>
+    <dgm:effectClrLst/>
+    <dgm:txLinClrLst/>
+    <dgm:txFillClrLst meth="repeat">
+      <a:schemeClr val="tx1"/>
+    </dgm:txFillClrLst>
+    <dgm:txEffectClrLst/>
+  </dgm:styleLbl>
+  <dgm:styleLbl name="fgAcc1">
+    <dgm:fillClrLst meth="repeat">
+      <a:schemeClr val="lt1">
+        <a:alpha val="90000"/>
+      </a:schemeClr>
+    </dgm:fillClrLst>
+    <dgm:linClrLst>
+      <a:schemeClr val="accent5"/>
+      <a:schemeClr val="accent6"/>
+    </dgm:linClrLst>
+    <dgm:effectClrLst/>
+    <dgm:txLinClrLst/>
+    <dgm:txFillClrLst meth="repeat">
+      <a:schemeClr val="dk1"/>
+    </dgm:txFillClrLst>
+    <dgm:txEffectClrLst/>
+  </dgm:styleLbl>
+  <dgm:styleLbl name="conFgAcc1">
+    <dgm:fillClrLst meth="repeat">
+      <a:schemeClr val="lt1">
+        <a:alpha val="90000"/>
+      </a:schemeClr>
+    </dgm:fillClrLst>
+    <dgm:linClrLst>
+      <a:schemeClr val="accent5"/>
+      <a:schemeClr val="accent6"/>
+    </dgm:linClrLst>
+    <dgm:effectClrLst/>
+    <dgm:txLinClrLst/>
+    <dgm:txFillClrLst meth="repeat">
+      <a:schemeClr val="dk1"/>
+    </dgm:txFillClrLst>
+    <dgm:txEffectClrLst/>
+  </dgm:styleLbl>
+  <dgm:styleLbl name="alignAcc1">
+    <dgm:fillClrLst meth="repeat">
+      <a:schemeClr val="lt1">
+        <a:alpha val="90000"/>
+      </a:schemeClr>
+    </dgm:fillClrLst>
+    <dgm:linClrLst>
+      <a:schemeClr val="accent5"/>
+      <a:schemeClr val="accent6"/>
+    </dgm:linClrLst>
+    <dgm:effectClrLst/>
+    <dgm:txLinClrLst/>
+    <dgm:txFillClrLst meth="repeat">
+      <a:schemeClr val="dk1"/>
+    </dgm:txFillClrLst>
+    <dgm:txEffectClrLst/>
+  </dgm:styleLbl>
+  <dgm:styleLbl name="trAlignAcc1">
+    <dgm:fillClrLst meth="repeat">
+      <a:schemeClr val="lt1">
+        <a:alpha val="40000"/>
+      </a:schemeClr>
+    </dgm:fillClrLst>
+    <dgm:linClrLst meth="repeat">
+      <a:schemeClr val="accent5"/>
+    </dgm:linClrLst>
+    <dgm:effectClrLst/>
+    <dgm:txLinClrLst/>
+    <dgm:txFillClrLst meth="repeat">
+      <a:schemeClr val="dk1"/>
+    </dgm:txFillClrLst>
+    <dgm:txEffectClrLst/>
+  </dgm:styleLbl>
+  <dgm:styleLbl name="bgAcc1">
+    <dgm:fillClrLst meth="repeat">
+      <a:schemeClr val="lt1">
+        <a:alpha val="90000"/>
+      </a:schemeClr>
+    </dgm:fillClrLst>
+    <dgm:linClrLst>
+      <a:schemeClr val="accent5"/>
+      <a:schemeClr val="accent6"/>
+    </dgm:linClrLst>
+    <dgm:effectClrLst/>
+    <dgm:txLinClrLst/>
+    <dgm:txFillClrLst meth="repeat">
+      <a:schemeClr val="dk1"/>
+    </dgm:txFillClrLst>
+    <dgm:txEffectClrLst/>
+  </dgm:styleLbl>
+  <dgm:styleLbl name="solidFgAcc1">
+    <dgm:fillClrLst meth="repeat">
+      <a:schemeClr val="lt1"/>
+    </dgm:fillClrLst>
+    <dgm:linClrLst>
+      <a:schemeClr val="accent5"/>
+      <a:schemeClr val="accent6"/>
+    </dgm:linClrLst>
+    <dgm:effectClrLst/>
+    <dgm:txLinClrLst/>
+    <dgm:txFillClrLst meth="repeat">
+      <a:schemeClr val="dk1"/>
+    </dgm:txFillClrLst>
+    <dgm:txEffectClrLst/>
+  </dgm:styleLbl>
+  <dgm:styleLbl name="solidAlignAcc1">
+    <dgm:fillClrLst meth="repeat">
+      <a:schemeClr val="lt1"/>
+    </dgm:fillClrLst>
+    <dgm:linClrLst>
+      <a:schemeClr val="accent5"/>
+      <a:schemeClr val="accent6"/>
+    </dgm:linClrLst>
+    <dgm:effectClrLst/>
+    <dgm:txLinClrLst/>
+    <dgm:txFillClrLst meth="repeat">
+      <a:schemeClr val="dk1"/>
+    </dgm:txFillClrLst>
+    <dgm:txEffectClrLst/>
+  </dgm:styleLbl>
+  <dgm:styleLbl name="solidBgAcc1">
+    <dgm:fillClrLst meth="repeat">
+      <a:schemeClr val="lt1"/>
+    </dgm:fillClrLst>
+    <dgm:linClrLst>
+      <a:schemeClr val="accent5"/>
+      <a:schemeClr val="accent6"/>
+    </dgm:linClrLst>
+    <dgm:effectClrLst/>
+    <dgm:txLinClrLst/>
+    <dgm:txFillClrLst meth="repeat">
+      <a:schemeClr val="dk1"/>
+    </dgm:txFillClrLst>
+    <dgm:txEffectClrLst/>
+  </dgm:styleLbl>
+  <dgm:styleLbl name="fgAccFollowNode1">
+    <dgm:fillClrLst>
+      <a:schemeClr val="accent5">
+        <a:tint val="40000"/>
+        <a:alpha val="90000"/>
+      </a:schemeClr>
+      <a:schemeClr val="accent6">
+        <a:tint val="40000"/>
+        <a:alpha val="90000"/>
+      </a:schemeClr>
+    </dgm:fillClrLst>
+    <dgm:linClrLst>
+      <a:schemeClr val="accent5">
+        <a:tint val="40000"/>
+        <a:alpha val="90000"/>
+      </a:schemeClr>
+      <a:schemeClr val="accent5">
+        <a:tint val="40000"/>
+        <a:alpha val="90000"/>
+      </a:schemeClr>
+    </dgm:linClrLst>
+    <dgm:effectClrLst/>
+    <dgm:txLinClrLst/>
+    <dgm:txFillClrLst meth="repeat">
+      <a:schemeClr val="dk1"/>
+    </dgm:txFillClrLst>
+    <dgm:txEffectClrLst/>
+  </dgm:styleLbl>
+  <dgm:styleLbl name="alignAccFollowNode1">
+    <dgm:fillClrLst>
+      <a:schemeClr val="accent5">
+        <a:tint val="40000"/>
+        <a:alpha val="90000"/>
+      </a:schemeClr>
+      <a:schemeClr val="accent6">
+        <a:tint val="40000"/>
+        <a:alpha val="90000"/>
+      </a:schemeClr>
+    </dgm:fillClrLst>
+    <dgm:linClrLst>
+      <a:schemeClr val="accent5">
+        <a:tint val="40000"/>
+        <a:alpha val="90000"/>
+      </a:schemeClr>
+      <a:schemeClr val="accent6">
+        <a:tint val="40000"/>
+        <a:alpha val="90000"/>
+      </a:schemeClr>
+    </dgm:linClrLst>
+    <dgm:effectClrLst/>
+    <dgm:txLinClrLst/>
+    <dgm:txFillClrLst meth="repeat">
+      <a:schemeClr val="dk1"/>
+    </dgm:txFillClrLst>
+    <dgm:txEffectClrLst/>
+  </dgm:styleLbl>
+  <dgm:styleLbl name="bgAccFollowNode1">
+    <dgm:fillClrLst>
+      <a:schemeClr val="accent5">
+        <a:tint val="40000"/>
+        <a:alpha val="90000"/>
+      </a:schemeClr>
+      <a:schemeClr val="accent6">
+        <a:tint val="40000"/>
+        <a:alpha val="90000"/>
+      </a:schemeClr>
+    </dgm:fillClrLst>
+    <dgm:linClrLst>
+      <a:schemeClr val="accent5">
+        <a:tint val="40000"/>
+        <a:alpha val="90000"/>
+      </a:schemeClr>
+      <a:schemeClr val="accent6">
+        <a:tint val="40000"/>
+        <a:alpha val="90000"/>
+      </a:schemeClr>
+    </dgm:linClrLst>
+    <dgm:effectClrLst/>
+    <dgm:txLinClrLst/>
+    <dgm:txFillClrLst meth="repeat">
+      <a:schemeClr val="dk1"/>
+    </dgm:txFillClrLst>
+    <dgm:txEffectClrLst/>
+  </dgm:styleLbl>
+  <dgm:styleLbl name="fgAcc0">
+    <dgm:fillClrLst meth="repeat">
+      <a:schemeClr val="lt1">
+        <a:alpha val="90000"/>
+      </a:schemeClr>
+    </dgm:fillClrLst>
+    <dgm:linClrLst>
+      <a:schemeClr val="accent4"/>
+    </dgm:linClrLst>
+    <dgm:effectClrLst/>
+    <dgm:txLinClrLst/>
+    <dgm:txFillClrLst meth="repeat">
+      <a:schemeClr val="dk1"/>
+    </dgm:txFillClrLst>
+    <dgm:txEffectClrLst/>
+  </dgm:styleLbl>
+  <dgm:styleLbl name="fgAcc2">
+    <dgm:fillClrLst meth="repeat">
+      <a:schemeClr val="lt1">
+        <a:alpha val="90000"/>
+      </a:schemeClr>
+    </dgm:fillClrLst>
+    <dgm:linClrLst>
+      <a:schemeClr val="accent6"/>
+    </dgm:linClrLst>
+    <dgm:effectClrLst/>
+    <dgm:txLinClrLst/>
+    <dgm:txFillClrLst meth="repeat">
+      <a:schemeClr val="dk1"/>
+    </dgm:txFillClrLst>
+    <dgm:txEffectClrLst/>
+  </dgm:styleLbl>
+  <dgm:styleLbl name="fgAcc3">
+    <dgm:fillClrLst meth="repeat">
+      <a:schemeClr val="lt1">
+        <a:alpha val="90000"/>
+      </a:schemeClr>
+    </dgm:fillClrLst>
+    <dgm:linClrLst>
+      <a:schemeClr val="accent1"/>
+    </dgm:linClrLst>
+    <dgm:effectClrLst/>
+    <dgm:txLinClrLst/>
+    <dgm:txFillClrLst meth="repeat">
+      <a:schemeClr val="dk1"/>
+    </dgm:txFillClrLst>
+    <dgm:txEffectClrLst/>
+  </dgm:styleLbl>
+  <dgm:styleLbl name="fgAcc4">
+    <dgm:fillClrLst meth="repeat">
+      <a:schemeClr val="lt1">
+        <a:alpha val="90000"/>
+      </a:schemeClr>
+    </dgm:fillClrLst>
+    <dgm:linClrLst>
+      <a:schemeClr val="accent2"/>
+    </dgm:linClrLst>
+    <dgm:effectClrLst/>
+    <dgm:txLinClrLst/>
+    <dgm:txFillClrLst meth="repeat">
+      <a:schemeClr val="dk1"/>
+    </dgm:txFillClrLst>
+    <dgm:txEffectClrLst/>
+  </dgm:styleLbl>
+  <dgm:styleLbl name="bgShp">
+    <dgm:fillClrLst meth="repeat">
+      <a:schemeClr val="accent5">
+        <a:tint val="40000"/>
+      </a:schemeClr>
+    </dgm:fillClrLst>
+    <dgm:linClrLst meth="repeat">
+      <a:schemeClr val="dk1"/>
+    </dgm:linClrLst>
+    <dgm:effectClrLst/>
+    <dgm:txLinClrLst/>
+    <dgm:txFillClrLst meth="repeat">
+      <a:schemeClr val="dk1"/>
+    </dgm:txFillClrLst>
+    <dgm:txEffectClrLst/>
+  </dgm:styleLbl>
+  <dgm:styleLbl name="dkBgShp">
+    <dgm:fillClrLst meth="repeat">
+      <a:schemeClr val="accent5">
+        <a:shade val="90000"/>
+      </a:schemeClr>
+    </dgm:fillClrLst>
+    <dgm:linClrLst meth="repeat">
+      <a:schemeClr val="dk1"/>
+    </dgm:linClrLst>
+    <dgm:effectClrLst/>
+    <dgm:txLinClrLst/>
+    <dgm:txFillClrLst meth="repeat">
+      <a:schemeClr val="lt1"/>
+    </dgm:txFillClrLst>
+    <dgm:txEffectClrLst/>
+  </dgm:styleLbl>
+  <dgm:styleLbl name="trBgShp">
+    <dgm:fillClrLst meth="repeat">
+      <a:schemeClr val="accent5">
+        <a:tint val="50000"/>
+        <a:alpha val="40000"/>
+      </a:schemeClr>
+    </dgm:fillClrLst>
+    <dgm:linClrLst meth="repeat">
+      <a:schemeClr val="accent5"/>
+    </dgm:linClrLst>
+    <dgm:effectClrLst/>
+    <dgm:txLinClrLst/>
+    <dgm:txFillClrLst meth="repeat">
+      <a:schemeClr val="lt1"/>
+    </dgm:txFillClrLst>
+    <dgm:txEffectClrLst/>
+  </dgm:styleLbl>
+  <dgm:styleLbl name="fgShp">
+    <dgm:fillClrLst meth="repeat">
+      <a:schemeClr val="accent5">
+        <a:tint val="40000"/>
+      </a:schemeClr>
+    </dgm:fillClrLst>
+    <dgm:linClrLst meth="repeat">
+      <a:schemeClr val="lt1"/>
+    </dgm:linClrLst>
+    <dgm:effectClrLst/>
+    <dgm:txLinClrLst/>
+    <dgm:txFillClrLst meth="repeat">
+      <a:schemeClr val="dk1"/>
+    </dgm:txFillClrLst>
+    <dgm:txEffectClrLst/>
+  </dgm:styleLbl>
+  <dgm:styleLbl name="revTx">
+    <dgm:fillClrLst meth="repeat">
+      <a:schemeClr val="lt1">
+        <a:alpha val="0"/>
+      </a:schemeClr>
+    </dgm:fillClrLst>
+    <dgm:linClrLst meth="repeat">
+      <a:schemeClr val="dk1">
+        <a:alpha val="0"/>
+      </a:schemeClr>
+    </dgm:linClrLst>
+    <dgm:effectClrLst/>
+    <dgm:txLinClrLst/>
+    <dgm:txFillClrLst meth="repeat">
+      <a:schemeClr val="tx1"/>
+    </dgm:txFillClrLst>
+    <dgm:txEffectClrLst/>
+  </dgm:styleLbl>
+</dgm:colorsDef>
+</file>
+
+<file path=ppt/diagrams/colors2.xml><?xml version="1.0" encoding="utf-8"?>
 <dgm:colorsDef xmlns:dgm="http://schemas.openxmlformats.org/drawingml/2006/diagram" xmlns:a="http://schemas.openxmlformats.org/drawingml/2006/main" uniqueId="urn:microsoft.com/office/officeart/2005/8/colors/colorful5">
   <dgm:title val=""/>
   <dgm:desc val=""/>
@@ -1248,6 +2036,13 @@
         </dgm:presLayoutVars>
       </dgm:prSet>
       <dgm:spPr/>
+      <dgm:t>
+        <a:bodyPr/>
+        <a:lstStyle/>
+        <a:p>
+          <a:endParaRPr lang="en-US"/>
+        </a:p>
+      </dgm:t>
     </dgm:pt>
     <dgm:pt modelId="{06BB7C01-9DF8-40B4-A58D-9ECD11BDC83F}" type="pres">
       <dgm:prSet presAssocID="{D67C4600-62E5-4084-84C0-FD2FB9AD0B6C}" presName="arc1" presStyleLbl="node1" presStyleIdx="0" presStyleCnt="4"/>
@@ -1266,6 +2061,13 @@
         </dgm:presLayoutVars>
       </dgm:prSet>
       <dgm:spPr/>
+      <dgm:t>
+        <a:bodyPr/>
+        <a:lstStyle/>
+        <a:p>
+          <a:endParaRPr lang="en-US"/>
+        </a:p>
+      </dgm:t>
     </dgm:pt>
     <dgm:pt modelId="{0518B534-DC62-4E17-85D9-AA657CEE396C}" type="pres">
       <dgm:prSet presAssocID="{D67C4600-62E5-4084-84C0-FD2FB9AD0B6C}" presName="arc2" presStyleLbl="node1" presStyleIdx="2" presStyleCnt="4"/>
@@ -1284,6 +2086,13 @@
         </dgm:presLayoutVars>
       </dgm:prSet>
       <dgm:spPr/>
+      <dgm:t>
+        <a:bodyPr/>
+        <a:lstStyle/>
+        <a:p>
+          <a:endParaRPr lang="en-US"/>
+        </a:p>
+      </dgm:t>
     </dgm:pt>
     <dgm:pt modelId="{D3789300-F881-4FDF-91F6-5DBD53B414A6}" type="pres">
       <dgm:prSet presAssocID="{D67C4600-62E5-4084-84C0-FD2FB9AD0B6C}" presName="middleComposite" presStyleCnt="0"/>
@@ -1292,6 +2101,13 @@
     <dgm:pt modelId="{A04132B8-9CD6-47BF-B2BB-89920AAB372E}" type="pres">
       <dgm:prSet presAssocID="{1965C95A-315E-4A76-978D-79F3E5BB5761}" presName="circ1" presStyleLbl="vennNode1" presStyleIdx="0" presStyleCnt="8"/>
       <dgm:spPr/>
+      <dgm:t>
+        <a:bodyPr/>
+        <a:lstStyle/>
+        <a:p>
+          <a:endParaRPr lang="en-US"/>
+        </a:p>
+      </dgm:t>
     </dgm:pt>
     <dgm:pt modelId="{5A253334-7A12-48C0-B5A8-AEE409E7B765}" type="pres">
       <dgm:prSet presAssocID="{1965C95A-315E-4A76-978D-79F3E5BB5761}" presName="circ1Tx" presStyleLbl="revTx" presStyleIdx="1" presStyleCnt="3">
@@ -1301,10 +2117,24 @@
         </dgm:presLayoutVars>
       </dgm:prSet>
       <dgm:spPr/>
+      <dgm:t>
+        <a:bodyPr/>
+        <a:lstStyle/>
+        <a:p>
+          <a:endParaRPr lang="en-US"/>
+        </a:p>
+      </dgm:t>
     </dgm:pt>
     <dgm:pt modelId="{F2542C5A-AEF4-408D-9B27-1AAC407FAE75}" type="pres">
       <dgm:prSet presAssocID="{586AA99F-AB66-49AB-A326-73D6F1E88ADA}" presName="circ2" presStyleLbl="vennNode1" presStyleIdx="1" presStyleCnt="8"/>
       <dgm:spPr/>
+      <dgm:t>
+        <a:bodyPr/>
+        <a:lstStyle/>
+        <a:p>
+          <a:endParaRPr lang="en-US"/>
+        </a:p>
+      </dgm:t>
     </dgm:pt>
     <dgm:pt modelId="{CBEF1502-9BB7-4F8C-B472-F7F71C6AF1DB}" type="pres">
       <dgm:prSet presAssocID="{586AA99F-AB66-49AB-A326-73D6F1E88ADA}" presName="circ2Tx" presStyleLbl="revTx" presStyleIdx="1" presStyleCnt="3">
@@ -1314,10 +2144,24 @@
         </dgm:presLayoutVars>
       </dgm:prSet>
       <dgm:spPr/>
+      <dgm:t>
+        <a:bodyPr/>
+        <a:lstStyle/>
+        <a:p>
+          <a:endParaRPr lang="en-US"/>
+        </a:p>
+      </dgm:t>
     </dgm:pt>
     <dgm:pt modelId="{985D2040-7084-45AB-805C-3961BB24AE11}" type="pres">
       <dgm:prSet presAssocID="{3162AD7F-CC80-4477-8BAA-A265E296BEB7}" presName="circ3" presStyleLbl="vennNode1" presStyleIdx="2" presStyleCnt="8"/>
       <dgm:spPr/>
+      <dgm:t>
+        <a:bodyPr/>
+        <a:lstStyle/>
+        <a:p>
+          <a:endParaRPr lang="en-US"/>
+        </a:p>
+      </dgm:t>
     </dgm:pt>
     <dgm:pt modelId="{8FCCD69C-3017-4B9C-9848-8C9D49A44D8B}" type="pres">
       <dgm:prSet presAssocID="{3162AD7F-CC80-4477-8BAA-A265E296BEB7}" presName="circ3Tx" presStyleLbl="revTx" presStyleIdx="1" presStyleCnt="3">
@@ -1327,6 +2171,13 @@
         </dgm:presLayoutVars>
       </dgm:prSet>
       <dgm:spPr/>
+      <dgm:t>
+        <a:bodyPr/>
+        <a:lstStyle/>
+        <a:p>
+          <a:endParaRPr lang="en-US"/>
+        </a:p>
+      </dgm:t>
     </dgm:pt>
     <dgm:pt modelId="{44AFB30A-1692-4D5A-8D97-4CF4A13D5FC1}" type="pres">
       <dgm:prSet presAssocID="{D67C4600-62E5-4084-84C0-FD2FB9AD0B6C}" presName="leftComposite" presStyleCnt="0"/>
@@ -1340,6 +2191,13 @@
         </dgm:presLayoutVars>
       </dgm:prSet>
       <dgm:spPr/>
+      <dgm:t>
+        <a:bodyPr/>
+        <a:lstStyle/>
+        <a:p>
+          <a:endParaRPr lang="en-US"/>
+        </a:p>
+      </dgm:t>
     </dgm:pt>
     <dgm:pt modelId="{FE4AA2AE-1E25-43B1-9B19-CFE51BE51A15}" type="pres">
       <dgm:prSet presAssocID="{C6AB1840-21EA-4229-A79D-F04AB66763BC}" presName="ellipse1" presStyleLbl="vennNode1" presStyleIdx="4" presStyleCnt="8"/>
@@ -1357,6 +2215,13 @@
         </dgm:presLayoutVars>
       </dgm:prSet>
       <dgm:spPr/>
+      <dgm:t>
+        <a:bodyPr/>
+        <a:lstStyle/>
+        <a:p>
+          <a:endParaRPr lang="en-US"/>
+        </a:p>
+      </dgm:t>
     </dgm:pt>
     <dgm:pt modelId="{867564D6-4CBC-4E74-868E-75914939A563}" type="pres">
       <dgm:prSet presAssocID="{E59C24D7-567B-4827-8028-D3040DBF7F21}" presName="ellipse3" presStyleLbl="vennNode1" presStyleIdx="7" presStyleCnt="8"/>
@@ -1387,31 +2252,38 @@
         </dgm:presLayoutVars>
       </dgm:prSet>
       <dgm:spPr/>
+      <dgm:t>
+        <a:bodyPr/>
+        <a:lstStyle/>
+        <a:p>
+          <a:endParaRPr lang="en-US"/>
+        </a:p>
+      </dgm:t>
     </dgm:pt>
   </dgm:ptLst>
   <dgm:cxnLst>
+    <dgm:cxn modelId="{03DFA78D-133F-41E3-A2C6-ABABD9B835FD}" type="presOf" srcId="{1965C95A-315E-4A76-978D-79F3E5BB5761}" destId="{A04132B8-9CD6-47BF-B2BB-89920AAB372E}" srcOrd="0" destOrd="0" presId="urn:microsoft.com/office/officeart/2009/3/layout/PhasedProcess"/>
+    <dgm:cxn modelId="{5D2B2A3B-7558-4AD1-A375-41B8C8A3CEA2}" type="presOf" srcId="{5921E58E-391F-4700-A092-5240F051CDEF}" destId="{7F8286A3-6B65-4F08-B8CE-5A1952659120}" srcOrd="0" destOrd="0" presId="urn:microsoft.com/office/officeart/2009/3/layout/PhasedProcess"/>
+    <dgm:cxn modelId="{3699285A-34E9-460E-8AEF-F0FB46133626}" srcId="{21E528D7-9A98-4B55-AFBC-B7D0BB13E3AA}" destId="{586AA99F-AB66-49AB-A326-73D6F1E88ADA}" srcOrd="1" destOrd="0" parTransId="{894CE11F-6836-4CF0-B275-9F11BCDF3975}" sibTransId="{5B91AFB7-9452-421C-898A-706A5C7DF4BB}"/>
+    <dgm:cxn modelId="{95043B69-E2FB-416D-A6FC-2C3923249F18}" type="presOf" srcId="{1965C95A-315E-4A76-978D-79F3E5BB5761}" destId="{5A253334-7A12-48C0-B5A8-AEE409E7B765}" srcOrd="1" destOrd="0" presId="urn:microsoft.com/office/officeart/2009/3/layout/PhasedProcess"/>
+    <dgm:cxn modelId="{0C83BBB3-C21D-45EA-B015-644F7364DFD7}" srcId="{D67C4600-62E5-4084-84C0-FD2FB9AD0B6C}" destId="{5921E58E-391F-4700-A092-5240F051CDEF}" srcOrd="0" destOrd="0" parTransId="{19CACE21-E2AC-4B78-A887-18D45365F2DF}" sibTransId="{BBDE1A54-469C-4750-8084-F46FA939CD20}"/>
+    <dgm:cxn modelId="{0CC5A0DB-A9AE-4CC1-9255-C200ABE7E308}" type="presOf" srcId="{586AA99F-AB66-49AB-A326-73D6F1E88ADA}" destId="{CBEF1502-9BB7-4F8C-B472-F7F71C6AF1DB}" srcOrd="1" destOrd="0" presId="urn:microsoft.com/office/officeart/2009/3/layout/PhasedProcess"/>
     <dgm:cxn modelId="{127E1448-A23A-4E39-B11C-423104D71F67}" srcId="{5921E58E-391F-4700-A092-5240F051CDEF}" destId="{E59C24D7-567B-4827-8028-D3040DBF7F21}" srcOrd="1" destOrd="0" parTransId="{A4F91B9E-4D2F-43C1-A361-A47D2BBB1254}" sibTransId="{DF3E3C4A-7EA7-43B0-B41B-521987379B88}"/>
+    <dgm:cxn modelId="{E9F5DAB0-2DD0-4531-ACD2-6B94F733E61A}" type="presOf" srcId="{21E528D7-9A98-4B55-AFBC-B7D0BB13E3AA}" destId="{B38C9642-7F80-48C2-9905-34576DDC7FEB}" srcOrd="0" destOrd="0" presId="urn:microsoft.com/office/officeart/2009/3/layout/PhasedProcess"/>
+    <dgm:cxn modelId="{3346644E-3177-487E-A713-E75AE91085D5}" srcId="{5921E58E-391F-4700-A092-5240F051CDEF}" destId="{C6AB1840-21EA-4229-A79D-F04AB66763BC}" srcOrd="0" destOrd="0" parTransId="{66663020-3B42-4CAC-BCCC-F2702C9E88CF}" sibTransId="{71ECAE4B-0B35-4D91-B89F-EAE7C7CCC3FA}"/>
+    <dgm:cxn modelId="{7B5A5CEE-A4C2-4639-84D6-F30E1BEA8A9E}" type="presOf" srcId="{A0ACE874-2F14-4B94-B78C-6E888302E845}" destId="{D6A1863D-44C1-404B-8B32-4F6379312C2F}" srcOrd="0" destOrd="0" presId="urn:microsoft.com/office/officeart/2009/3/layout/PhasedProcess"/>
+    <dgm:cxn modelId="{5749EAB6-AA64-4981-BDF8-9B3B019B06B9}" srcId="{21E528D7-9A98-4B55-AFBC-B7D0BB13E3AA}" destId="{3162AD7F-CC80-4477-8BAA-A265E296BEB7}" srcOrd="2" destOrd="0" parTransId="{2BC4BE57-447E-4240-9528-577B843D32CB}" sibTransId="{711941E0-9109-4AC0-8DD4-EF75215FF61E}"/>
+    <dgm:cxn modelId="{3302A15B-98EA-47FC-A1DF-0FE95C6130D5}" type="presOf" srcId="{4F3A271F-7707-4DD7-8DD0-3950F4B8EDA4}" destId="{5A8BD94B-5744-4BCD-879D-246997A1BE67}" srcOrd="0" destOrd="0" presId="urn:microsoft.com/office/officeart/2009/3/layout/PhasedProcess"/>
+    <dgm:cxn modelId="{28C04AD3-00D7-4B4B-A9A9-F29B0A2A4E60}" type="presOf" srcId="{3162AD7F-CC80-4477-8BAA-A265E296BEB7}" destId="{985D2040-7084-45AB-805C-3961BB24AE11}" srcOrd="0" destOrd="0" presId="urn:microsoft.com/office/officeart/2009/3/layout/PhasedProcess"/>
+    <dgm:cxn modelId="{7FCECE1B-D99A-4883-85CC-FBCA3F4896DC}" srcId="{21E528D7-9A98-4B55-AFBC-B7D0BB13E3AA}" destId="{1965C95A-315E-4A76-978D-79F3E5BB5761}" srcOrd="0" destOrd="0" parTransId="{103A9607-D9D9-4771-B4AF-BEA4E3EBAD53}" sibTransId="{51D86FBC-DC6B-4568-8EAE-C6FF4F6FE528}"/>
     <dgm:cxn modelId="{E6245EE8-D483-4724-AF12-502062F1C5B6}" type="presOf" srcId="{D67C4600-62E5-4084-84C0-FD2FB9AD0B6C}" destId="{C31CC36F-4BBE-4ED0-8725-005D35483148}" srcOrd="0" destOrd="0" presId="urn:microsoft.com/office/officeart/2009/3/layout/PhasedProcess"/>
-    <dgm:cxn modelId="{03DFA78D-133F-41E3-A2C6-ABABD9B835FD}" type="presOf" srcId="{1965C95A-315E-4A76-978D-79F3E5BB5761}" destId="{A04132B8-9CD6-47BF-B2BB-89920AAB372E}" srcOrd="0" destOrd="0" presId="urn:microsoft.com/office/officeart/2009/3/layout/PhasedProcess"/>
     <dgm:cxn modelId="{C5FF40E4-752E-4AA5-A084-7D419203E62D}" srcId="{A0ACE874-2F14-4B94-B78C-6E888302E845}" destId="{4F3A271F-7707-4DD7-8DD0-3950F4B8EDA4}" srcOrd="0" destOrd="0" parTransId="{7DA8B6DE-7FE4-4789-80EF-0D16B56BF8FC}" sibTransId="{6FE39593-4B74-41A4-823F-9FCAB96DF955}"/>
+    <dgm:cxn modelId="{55948B83-3571-48B7-8B2A-CE64E6E104A9}" type="presOf" srcId="{3162AD7F-CC80-4477-8BAA-A265E296BEB7}" destId="{8FCCD69C-3017-4B9C-9848-8C9D49A44D8B}" srcOrd="1" destOrd="0" presId="urn:microsoft.com/office/officeart/2009/3/layout/PhasedProcess"/>
+    <dgm:cxn modelId="{34D20401-5C10-413F-8A68-DE5E1857B6F8}" type="presOf" srcId="{C6AB1840-21EA-4229-A79D-F04AB66763BC}" destId="{BFBFC44E-8039-47C7-8EB4-2232798AF365}" srcOrd="0" destOrd="0" presId="urn:microsoft.com/office/officeart/2009/3/layout/PhasedProcess"/>
+    <dgm:cxn modelId="{F49B3393-7A5E-441E-B462-1127D987FC2D}" srcId="{D67C4600-62E5-4084-84C0-FD2FB9AD0B6C}" destId="{A0ACE874-2F14-4B94-B78C-6E888302E845}" srcOrd="2" destOrd="0" parTransId="{1A7FA424-B4CD-45F9-9EA4-E7A734479AF2}" sibTransId="{5C224387-DB7D-4C8D-88DF-7ADAE9ED9AA1}"/>
+    <dgm:cxn modelId="{6D3FE685-3043-4FE5-BA4B-A5FC24ECAE5E}" type="presOf" srcId="{586AA99F-AB66-49AB-A326-73D6F1E88ADA}" destId="{F2542C5A-AEF4-408D-9B27-1AAC407FAE75}" srcOrd="0" destOrd="0" presId="urn:microsoft.com/office/officeart/2009/3/layout/PhasedProcess"/>
     <dgm:cxn modelId="{D1810721-E9BF-4762-B32D-DB480E4E22A0}" type="presOf" srcId="{E59C24D7-567B-4827-8028-D3040DBF7F21}" destId="{A1C36037-A659-47E1-9158-721142E95F2D}" srcOrd="0" destOrd="0" presId="urn:microsoft.com/office/officeart/2009/3/layout/PhasedProcess"/>
-    <dgm:cxn modelId="{F49B3393-7A5E-441E-B462-1127D987FC2D}" srcId="{D67C4600-62E5-4084-84C0-FD2FB9AD0B6C}" destId="{A0ACE874-2F14-4B94-B78C-6E888302E845}" srcOrd="2" destOrd="0" parTransId="{1A7FA424-B4CD-45F9-9EA4-E7A734479AF2}" sibTransId="{5C224387-DB7D-4C8D-88DF-7ADAE9ED9AA1}"/>
-    <dgm:cxn modelId="{7B5A5CEE-A4C2-4639-84D6-F30E1BEA8A9E}" type="presOf" srcId="{A0ACE874-2F14-4B94-B78C-6E888302E845}" destId="{D6A1863D-44C1-404B-8B32-4F6379312C2F}" srcOrd="0" destOrd="0" presId="urn:microsoft.com/office/officeart/2009/3/layout/PhasedProcess"/>
-    <dgm:cxn modelId="{5D2B2A3B-7558-4AD1-A375-41B8C8A3CEA2}" type="presOf" srcId="{5921E58E-391F-4700-A092-5240F051CDEF}" destId="{7F8286A3-6B65-4F08-B8CE-5A1952659120}" srcOrd="0" destOrd="0" presId="urn:microsoft.com/office/officeart/2009/3/layout/PhasedProcess"/>
-    <dgm:cxn modelId="{0C83BBB3-C21D-45EA-B015-644F7364DFD7}" srcId="{D67C4600-62E5-4084-84C0-FD2FB9AD0B6C}" destId="{5921E58E-391F-4700-A092-5240F051CDEF}" srcOrd="0" destOrd="0" parTransId="{19CACE21-E2AC-4B78-A887-18D45365F2DF}" sibTransId="{BBDE1A54-469C-4750-8084-F46FA939CD20}"/>
     <dgm:cxn modelId="{BC029B1D-5069-4C69-9747-C8B4030D6DC6}" srcId="{D67C4600-62E5-4084-84C0-FD2FB9AD0B6C}" destId="{21E528D7-9A98-4B55-AFBC-B7D0BB13E3AA}" srcOrd="1" destOrd="0" parTransId="{7F9A6506-434A-4145-8EC8-A282B6C84DAE}" sibTransId="{258ED730-EF84-4E7B-B343-05670FD95BF3}"/>
-    <dgm:cxn modelId="{3699285A-34E9-460E-8AEF-F0FB46133626}" srcId="{21E528D7-9A98-4B55-AFBC-B7D0BB13E3AA}" destId="{586AA99F-AB66-49AB-A326-73D6F1E88ADA}" srcOrd="1" destOrd="0" parTransId="{894CE11F-6836-4CF0-B275-9F11BCDF3975}" sibTransId="{5B91AFB7-9452-421C-898A-706A5C7DF4BB}"/>
-    <dgm:cxn modelId="{3346644E-3177-487E-A713-E75AE91085D5}" srcId="{5921E58E-391F-4700-A092-5240F051CDEF}" destId="{C6AB1840-21EA-4229-A79D-F04AB66763BC}" srcOrd="0" destOrd="0" parTransId="{66663020-3B42-4CAC-BCCC-F2702C9E88CF}" sibTransId="{71ECAE4B-0B35-4D91-B89F-EAE7C7CCC3FA}"/>
-    <dgm:cxn modelId="{3302A15B-98EA-47FC-A1DF-0FE95C6130D5}" type="presOf" srcId="{4F3A271F-7707-4DD7-8DD0-3950F4B8EDA4}" destId="{5A8BD94B-5744-4BCD-879D-246997A1BE67}" srcOrd="0" destOrd="0" presId="urn:microsoft.com/office/officeart/2009/3/layout/PhasedProcess"/>
-    <dgm:cxn modelId="{34D20401-5C10-413F-8A68-DE5E1857B6F8}" type="presOf" srcId="{C6AB1840-21EA-4229-A79D-F04AB66763BC}" destId="{BFBFC44E-8039-47C7-8EB4-2232798AF365}" srcOrd="0" destOrd="0" presId="urn:microsoft.com/office/officeart/2009/3/layout/PhasedProcess"/>
-    <dgm:cxn modelId="{0CC5A0DB-A9AE-4CC1-9255-C200ABE7E308}" type="presOf" srcId="{586AA99F-AB66-49AB-A326-73D6F1E88ADA}" destId="{CBEF1502-9BB7-4F8C-B472-F7F71C6AF1DB}" srcOrd="1" destOrd="0" presId="urn:microsoft.com/office/officeart/2009/3/layout/PhasedProcess"/>
-    <dgm:cxn modelId="{95043B69-E2FB-416D-A6FC-2C3923249F18}" type="presOf" srcId="{1965C95A-315E-4A76-978D-79F3E5BB5761}" destId="{5A253334-7A12-48C0-B5A8-AEE409E7B765}" srcOrd="1" destOrd="0" presId="urn:microsoft.com/office/officeart/2009/3/layout/PhasedProcess"/>
-    <dgm:cxn modelId="{7FCECE1B-D99A-4883-85CC-FBCA3F4896DC}" srcId="{21E528D7-9A98-4B55-AFBC-B7D0BB13E3AA}" destId="{1965C95A-315E-4A76-978D-79F3E5BB5761}" srcOrd="0" destOrd="0" parTransId="{103A9607-D9D9-4771-B4AF-BEA4E3EBAD53}" sibTransId="{51D86FBC-DC6B-4568-8EAE-C6FF4F6FE528}"/>
-    <dgm:cxn modelId="{E9F5DAB0-2DD0-4531-ACD2-6B94F733E61A}" type="presOf" srcId="{21E528D7-9A98-4B55-AFBC-B7D0BB13E3AA}" destId="{B38C9642-7F80-48C2-9905-34576DDC7FEB}" srcOrd="0" destOrd="0" presId="urn:microsoft.com/office/officeart/2009/3/layout/PhasedProcess"/>
-    <dgm:cxn modelId="{5749EAB6-AA64-4981-BDF8-9B3B019B06B9}" srcId="{21E528D7-9A98-4B55-AFBC-B7D0BB13E3AA}" destId="{3162AD7F-CC80-4477-8BAA-A265E296BEB7}" srcOrd="2" destOrd="0" parTransId="{2BC4BE57-447E-4240-9528-577B843D32CB}" sibTransId="{711941E0-9109-4AC0-8DD4-EF75215FF61E}"/>
-    <dgm:cxn modelId="{55948B83-3571-48B7-8B2A-CE64E6E104A9}" type="presOf" srcId="{3162AD7F-CC80-4477-8BAA-A265E296BEB7}" destId="{8FCCD69C-3017-4B9C-9848-8C9D49A44D8B}" srcOrd="1" destOrd="0" presId="urn:microsoft.com/office/officeart/2009/3/layout/PhasedProcess"/>
-    <dgm:cxn modelId="{28C04AD3-00D7-4B4B-A9A9-F29B0A2A4E60}" type="presOf" srcId="{3162AD7F-CC80-4477-8BAA-A265E296BEB7}" destId="{985D2040-7084-45AB-805C-3961BB24AE11}" srcOrd="0" destOrd="0" presId="urn:microsoft.com/office/officeart/2009/3/layout/PhasedProcess"/>
-    <dgm:cxn modelId="{6D3FE685-3043-4FE5-BA4B-A5FC24ECAE5E}" type="presOf" srcId="{586AA99F-AB66-49AB-A326-73D6F1E88ADA}" destId="{F2542C5A-AEF4-408D-9B27-1AAC407FAE75}" srcOrd="0" destOrd="0" presId="urn:microsoft.com/office/officeart/2009/3/layout/PhasedProcess"/>
     <dgm:cxn modelId="{2FD13A22-422D-4D17-9657-D8F1B07A4176}" type="presParOf" srcId="{C31CC36F-4BBE-4ED0-8725-005D35483148}" destId="{06BB7C01-9DF8-40B4-A58D-9ECD11BDC83F}" srcOrd="0" destOrd="0" presId="urn:microsoft.com/office/officeart/2009/3/layout/PhasedProcess"/>
     <dgm:cxn modelId="{2C126DC2-C533-44E8-861F-0CD3C78AE045}" type="presParOf" srcId="{C31CC36F-4BBE-4ED0-8725-005D35483148}" destId="{26B73948-FDF9-43F7-9904-372FD2B3961A}" srcOrd="1" destOrd="0" presId="urn:microsoft.com/office/officeart/2009/3/layout/PhasedProcess"/>
     <dgm:cxn modelId="{E14D4EAE-DC0D-4803-AF2B-474FB72D266D}" type="presParOf" srcId="{C31CC36F-4BBE-4ED0-8725-005D35483148}" destId="{B38C9642-7F80-48C2-9905-34576DDC7FEB}" srcOrd="2" destOrd="0" presId="urn:microsoft.com/office/officeart/2009/3/layout/PhasedProcess"/>
@@ -1433,6 +2305,455 @@
     <dgm:cxn modelId="{FED929FB-B40A-4465-82EF-A23D1DDEC0E6}" type="presParOf" srcId="{44AFB30A-1692-4D5A-8D97-4CF4A13D5FC1}" destId="{867564D6-4CBC-4E74-868E-75914939A563}" srcOrd="4" destOrd="0" presId="urn:microsoft.com/office/officeart/2009/3/layout/PhasedProcess"/>
     <dgm:cxn modelId="{551C1C41-C684-424A-A9B6-452022F28F9B}" type="presParOf" srcId="{C31CC36F-4BBE-4ED0-8725-005D35483148}" destId="{5A8BD94B-5744-4BCD-879D-246997A1BE67}" srcOrd="8" destOrd="0" presId="urn:microsoft.com/office/officeart/2009/3/layout/PhasedProcess"/>
     <dgm:cxn modelId="{1D33F9BD-E327-488E-BB5D-2657B1FB2125}" type="presParOf" srcId="{C31CC36F-4BBE-4ED0-8725-005D35483148}" destId="{7F8286A3-6B65-4F08-B8CE-5A1952659120}" srcOrd="9" destOrd="0" presId="urn:microsoft.com/office/officeart/2009/3/layout/PhasedProcess"/>
+  </dgm:cxnLst>
+  <dgm:bg/>
+  <dgm:whole/>
+  <dgm:extLst>
+    <a:ext uri="http://schemas.microsoft.com/office/drawing/2008/diagram">
+      <dsp:dataModelExt xmlns:dsp="http://schemas.microsoft.com/office/drawing/2008/diagram" relId="rId6" minVer="http://schemas.openxmlformats.org/drawingml/2006/diagram"/>
+    </a:ext>
+  </dgm:extLst>
+</dgm:dataModel>
+</file>
+
+<file path=ppt/diagrams/data2.xml><?xml version="1.0" encoding="utf-8"?>
+<dgm:dataModel xmlns:dgm="http://schemas.openxmlformats.org/drawingml/2006/diagram" xmlns:a="http://schemas.openxmlformats.org/drawingml/2006/main">
+  <dgm:ptLst>
+    <dgm:pt modelId="{50566C3F-72D8-4B9D-B172-562EE4AEA551}" type="doc">
+      <dgm:prSet loTypeId="urn:microsoft.com/office/officeart/2005/8/layout/hProcess9" loCatId="process" qsTypeId="urn:microsoft.com/office/officeart/2005/8/quickstyle/simple1" qsCatId="simple" csTypeId="urn:microsoft.com/office/officeart/2005/8/colors/colorful5" csCatId="colorful" phldr="1"/>
+      <dgm:spPr/>
+      <dgm:t>
+        <a:bodyPr/>
+        <a:lstStyle/>
+        <a:p>
+          <a:endParaRPr lang="en-US"/>
+        </a:p>
+      </dgm:t>
+    </dgm:pt>
+    <dgm:pt modelId="{4677E005-F769-4A9D-91D0-4A0342C20D4E}">
+      <dgm:prSet phldrT="[Text]"/>
+      <dgm:spPr/>
+      <dgm:t>
+        <a:bodyPr/>
+        <a:lstStyle/>
+        <a:p>
+          <a:r>
+            <a:rPr lang="en-US" dirty="0" smtClean="0"/>
+            <a:t>Article Metadata</a:t>
+          </a:r>
+          <a:endParaRPr lang="en-US" dirty="0"/>
+        </a:p>
+      </dgm:t>
+    </dgm:pt>
+    <dgm:pt modelId="{661547F2-BACD-4034-8B7B-94D7D0F7C8B7}" type="parTrans" cxnId="{642ED434-1379-405B-8656-F68376D5B72E}">
+      <dgm:prSet/>
+      <dgm:spPr/>
+      <dgm:t>
+        <a:bodyPr/>
+        <a:lstStyle/>
+        <a:p>
+          <a:endParaRPr lang="en-US"/>
+        </a:p>
+      </dgm:t>
+    </dgm:pt>
+    <dgm:pt modelId="{805B52CF-8124-4903-96AC-CDD12D94ECAE}" type="sibTrans" cxnId="{642ED434-1379-405B-8656-F68376D5B72E}">
+      <dgm:prSet/>
+      <dgm:spPr/>
+      <dgm:t>
+        <a:bodyPr/>
+        <a:lstStyle/>
+        <a:p>
+          <a:endParaRPr lang="en-US"/>
+        </a:p>
+      </dgm:t>
+    </dgm:pt>
+    <dgm:pt modelId="{68E6159D-47D3-4DA7-850F-16C5A8B2557B}">
+      <dgm:prSet phldrT="[Text]"/>
+      <dgm:spPr/>
+      <dgm:t>
+        <a:bodyPr/>
+        <a:lstStyle/>
+        <a:p>
+          <a:r>
+            <a:rPr lang="en-US" dirty="0" smtClean="0"/>
+            <a:t>Full Text</a:t>
+          </a:r>
+          <a:endParaRPr lang="en-US" dirty="0"/>
+        </a:p>
+      </dgm:t>
+    </dgm:pt>
+    <dgm:pt modelId="{69B705C9-B319-4298-9A66-C519206EB941}" type="parTrans" cxnId="{A98752BC-1347-4BAA-AB0E-1BACE661B5E0}">
+      <dgm:prSet/>
+      <dgm:spPr/>
+      <dgm:t>
+        <a:bodyPr/>
+        <a:lstStyle/>
+        <a:p>
+          <a:endParaRPr lang="en-US"/>
+        </a:p>
+      </dgm:t>
+    </dgm:pt>
+    <dgm:pt modelId="{27D2B6A9-FFEB-4530-A7D6-932E5120090B}" type="sibTrans" cxnId="{A98752BC-1347-4BAA-AB0E-1BACE661B5E0}">
+      <dgm:prSet/>
+      <dgm:spPr/>
+      <dgm:t>
+        <a:bodyPr/>
+        <a:lstStyle/>
+        <a:p>
+          <a:endParaRPr lang="en-US"/>
+        </a:p>
+      </dgm:t>
+    </dgm:pt>
+    <dgm:pt modelId="{649843C5-9CA6-446A-9731-6DBB3333D83D}">
+      <dgm:prSet phldrT="[Text]"/>
+      <dgm:spPr/>
+      <dgm:t>
+        <a:bodyPr/>
+        <a:lstStyle/>
+        <a:p>
+          <a:r>
+            <a:rPr lang="en-US" dirty="0" smtClean="0"/>
+            <a:t>Analysis</a:t>
+          </a:r>
+          <a:endParaRPr lang="en-US" dirty="0"/>
+        </a:p>
+      </dgm:t>
+    </dgm:pt>
+    <dgm:pt modelId="{99AFE336-CE31-4DE5-9007-CE4436580697}" type="parTrans" cxnId="{4A54AE33-0C66-49FC-99EB-FFDAC977245E}">
+      <dgm:prSet/>
+      <dgm:spPr/>
+      <dgm:t>
+        <a:bodyPr/>
+        <a:lstStyle/>
+        <a:p>
+          <a:endParaRPr lang="en-US"/>
+        </a:p>
+      </dgm:t>
+    </dgm:pt>
+    <dgm:pt modelId="{85BA92F0-E471-482B-A0F0-634B9BD71D69}" type="sibTrans" cxnId="{4A54AE33-0C66-49FC-99EB-FFDAC977245E}">
+      <dgm:prSet/>
+      <dgm:spPr/>
+      <dgm:t>
+        <a:bodyPr/>
+        <a:lstStyle/>
+        <a:p>
+          <a:endParaRPr lang="en-US"/>
+        </a:p>
+      </dgm:t>
+    </dgm:pt>
+    <dgm:pt modelId="{67586C50-7147-4EBB-8399-1183C1E5EE38}">
+      <dgm:prSet phldrT="[Text]"/>
+      <dgm:spPr/>
+      <dgm:t>
+        <a:bodyPr/>
+        <a:lstStyle/>
+        <a:p>
+          <a:r>
+            <a:rPr lang="en-US" dirty="0" smtClean="0"/>
+            <a:t>NewsAPI</a:t>
+          </a:r>
+          <a:endParaRPr lang="en-US" dirty="0"/>
+        </a:p>
+      </dgm:t>
+    </dgm:pt>
+    <dgm:pt modelId="{2FA489F3-BEC8-4CF9-A658-2325CD28E622}" type="parTrans" cxnId="{EF82A94F-C753-4A75-9FEB-9785A4BBAEC6}">
+      <dgm:prSet/>
+      <dgm:spPr/>
+      <dgm:t>
+        <a:bodyPr/>
+        <a:lstStyle/>
+        <a:p>
+          <a:endParaRPr lang="en-US"/>
+        </a:p>
+      </dgm:t>
+    </dgm:pt>
+    <dgm:pt modelId="{C9AAE18C-356E-4C9D-A89F-81E06A010621}" type="sibTrans" cxnId="{EF82A94F-C753-4A75-9FEB-9785A4BBAEC6}">
+      <dgm:prSet/>
+      <dgm:spPr/>
+      <dgm:t>
+        <a:bodyPr/>
+        <a:lstStyle/>
+        <a:p>
+          <a:endParaRPr lang="en-US"/>
+        </a:p>
+      </dgm:t>
+    </dgm:pt>
+    <dgm:pt modelId="{E0A1DD6A-FEB4-4EC2-AC2D-D67D26074C6E}">
+      <dgm:prSet phldrT="[Text]"/>
+      <dgm:spPr/>
+      <dgm:t>
+        <a:bodyPr/>
+        <a:lstStyle/>
+        <a:p>
+          <a:r>
+            <a:rPr lang="en-US" dirty="0" smtClean="0"/>
+            <a:t>Topic: Immigration</a:t>
+          </a:r>
+          <a:endParaRPr lang="en-US" dirty="0"/>
+        </a:p>
+      </dgm:t>
+    </dgm:pt>
+    <dgm:pt modelId="{078C20F8-997F-449F-AEE8-E7DB9471B662}" type="parTrans" cxnId="{A92F6104-0861-40F9-A77F-A14F60919CE1}">
+      <dgm:prSet/>
+      <dgm:spPr/>
+      <dgm:t>
+        <a:bodyPr/>
+        <a:lstStyle/>
+        <a:p>
+          <a:endParaRPr lang="en-US"/>
+        </a:p>
+      </dgm:t>
+    </dgm:pt>
+    <dgm:pt modelId="{C1B4AC7E-7354-437E-8B60-8EB8E31CF99E}" type="sibTrans" cxnId="{A92F6104-0861-40F9-A77F-A14F60919CE1}">
+      <dgm:prSet/>
+      <dgm:spPr/>
+      <dgm:t>
+        <a:bodyPr/>
+        <a:lstStyle/>
+        <a:p>
+          <a:endParaRPr lang="en-US"/>
+        </a:p>
+      </dgm:t>
+    </dgm:pt>
+    <dgm:pt modelId="{C5EDC3FF-EA6E-471D-815B-CFA750C4F706}">
+      <dgm:prSet phldrT="[Text]"/>
+      <dgm:spPr/>
+      <dgm:t>
+        <a:bodyPr/>
+        <a:lstStyle/>
+        <a:p>
+          <a:r>
+            <a:rPr lang="en-US" dirty="0" smtClean="0"/>
+            <a:t>Newspaper3k</a:t>
+          </a:r>
+          <a:endParaRPr lang="en-US" dirty="0"/>
+        </a:p>
+      </dgm:t>
+    </dgm:pt>
+    <dgm:pt modelId="{16B9CBD4-0F9A-4236-B0D3-5A0ECB85FB3B}" type="parTrans" cxnId="{A3725179-D09A-4893-A2D2-36CDC20F9792}">
+      <dgm:prSet/>
+      <dgm:spPr/>
+      <dgm:t>
+        <a:bodyPr/>
+        <a:lstStyle/>
+        <a:p>
+          <a:endParaRPr lang="en-US"/>
+        </a:p>
+      </dgm:t>
+    </dgm:pt>
+    <dgm:pt modelId="{344A6458-A44A-44EA-8474-4E8C98BF094E}" type="sibTrans" cxnId="{A3725179-D09A-4893-A2D2-36CDC20F9792}">
+      <dgm:prSet/>
+      <dgm:spPr/>
+      <dgm:t>
+        <a:bodyPr/>
+        <a:lstStyle/>
+        <a:p>
+          <a:endParaRPr lang="en-US"/>
+        </a:p>
+      </dgm:t>
+    </dgm:pt>
+    <dgm:pt modelId="{C9FC2216-03D6-4316-B115-CE4547F5AF62}">
+      <dgm:prSet phldrT="[Text]"/>
+      <dgm:spPr/>
+      <dgm:t>
+        <a:bodyPr/>
+        <a:lstStyle/>
+        <a:p>
+          <a:r>
+            <a:rPr lang="en-US" dirty="0" smtClean="0"/>
+            <a:t>URL’s from NewsAPI</a:t>
+          </a:r>
+          <a:endParaRPr lang="en-US" dirty="0"/>
+        </a:p>
+      </dgm:t>
+    </dgm:pt>
+    <dgm:pt modelId="{A8357C69-6FE9-45BD-A53B-F02A3AE25AD7}" type="parTrans" cxnId="{2E22BF80-8ED0-4761-8FA1-330D78DB88AB}">
+      <dgm:prSet/>
+      <dgm:spPr/>
+      <dgm:t>
+        <a:bodyPr/>
+        <a:lstStyle/>
+        <a:p>
+          <a:endParaRPr lang="en-US"/>
+        </a:p>
+      </dgm:t>
+    </dgm:pt>
+    <dgm:pt modelId="{992B276D-8F7E-4349-911E-A3D5AF6CBF8C}" type="sibTrans" cxnId="{2E22BF80-8ED0-4761-8FA1-330D78DB88AB}">
+      <dgm:prSet/>
+      <dgm:spPr/>
+      <dgm:t>
+        <a:bodyPr/>
+        <a:lstStyle/>
+        <a:p>
+          <a:endParaRPr lang="en-US"/>
+        </a:p>
+      </dgm:t>
+    </dgm:pt>
+    <dgm:pt modelId="{07127421-B1DB-4614-9309-B07B3DE38419}">
+      <dgm:prSet phldrT="[Text]"/>
+      <dgm:spPr/>
+      <dgm:t>
+        <a:bodyPr/>
+        <a:lstStyle/>
+        <a:p>
+          <a:r>
+            <a:rPr lang="en-US" dirty="0" smtClean="0"/>
+            <a:t>Sentiment (NLTK Vader)</a:t>
+          </a:r>
+          <a:endParaRPr lang="en-US" dirty="0"/>
+        </a:p>
+      </dgm:t>
+    </dgm:pt>
+    <dgm:pt modelId="{02276A56-DDD4-40F2-9278-131ADA994981}" type="parTrans" cxnId="{D4BBF14E-27AE-4FF6-B245-19D5601F8936}">
+      <dgm:prSet/>
+      <dgm:spPr/>
+      <dgm:t>
+        <a:bodyPr/>
+        <a:lstStyle/>
+        <a:p>
+          <a:endParaRPr lang="en-US"/>
+        </a:p>
+      </dgm:t>
+    </dgm:pt>
+    <dgm:pt modelId="{DEB7D60C-25CB-4E9E-B3CA-3212478EEE2C}" type="sibTrans" cxnId="{D4BBF14E-27AE-4FF6-B245-19D5601F8936}">
+      <dgm:prSet/>
+      <dgm:spPr/>
+      <dgm:t>
+        <a:bodyPr/>
+        <a:lstStyle/>
+        <a:p>
+          <a:endParaRPr lang="en-US"/>
+        </a:p>
+      </dgm:t>
+    </dgm:pt>
+    <dgm:pt modelId="{5EE58050-B517-41D0-AEA9-591C272A1314}">
+      <dgm:prSet phldrT="[Text]"/>
+      <dgm:spPr/>
+      <dgm:t>
+        <a:bodyPr/>
+        <a:lstStyle/>
+        <a:p>
+          <a:r>
+            <a:rPr lang="en-US" dirty="0" smtClean="0"/>
+            <a:t>Bigrams (NLTK)</a:t>
+          </a:r>
+          <a:endParaRPr lang="en-US" dirty="0"/>
+        </a:p>
+      </dgm:t>
+    </dgm:pt>
+    <dgm:pt modelId="{ED641DF8-5419-45E2-A9B0-D1BD363B1E0F}" type="parTrans" cxnId="{655DB861-49DE-45FF-A33F-D1137C4FBC81}">
+      <dgm:prSet/>
+      <dgm:spPr/>
+      <dgm:t>
+        <a:bodyPr/>
+        <a:lstStyle/>
+        <a:p>
+          <a:endParaRPr lang="en-US"/>
+        </a:p>
+      </dgm:t>
+    </dgm:pt>
+    <dgm:pt modelId="{0C6F117D-963A-4A3D-858A-1AE457E575F2}" type="sibTrans" cxnId="{655DB861-49DE-45FF-A33F-D1137C4FBC81}">
+      <dgm:prSet/>
+      <dgm:spPr/>
+      <dgm:t>
+        <a:bodyPr/>
+        <a:lstStyle/>
+        <a:p>
+          <a:endParaRPr lang="en-US"/>
+        </a:p>
+      </dgm:t>
+    </dgm:pt>
+    <dgm:pt modelId="{5B5A6F85-06A4-4980-AA69-6E2BABE04015}" type="pres">
+      <dgm:prSet presAssocID="{50566C3F-72D8-4B9D-B172-562EE4AEA551}" presName="CompostProcess" presStyleCnt="0">
+        <dgm:presLayoutVars>
+          <dgm:dir/>
+          <dgm:resizeHandles val="exact"/>
+        </dgm:presLayoutVars>
+      </dgm:prSet>
+      <dgm:spPr/>
+    </dgm:pt>
+    <dgm:pt modelId="{40F8DB0F-8A4F-48F6-B8FF-02EA328EA6E7}" type="pres">
+      <dgm:prSet presAssocID="{50566C3F-72D8-4B9D-B172-562EE4AEA551}" presName="arrow" presStyleLbl="bgShp" presStyleIdx="0" presStyleCnt="1"/>
+      <dgm:spPr/>
+    </dgm:pt>
+    <dgm:pt modelId="{97CC1BF7-24DF-4DCA-9ECE-D4E8CEBB1507}" type="pres">
+      <dgm:prSet presAssocID="{50566C3F-72D8-4B9D-B172-562EE4AEA551}" presName="linearProcess" presStyleCnt="0"/>
+      <dgm:spPr/>
+    </dgm:pt>
+    <dgm:pt modelId="{7E5B0976-430A-4222-BF6E-212E29A31958}" type="pres">
+      <dgm:prSet presAssocID="{4677E005-F769-4A9D-91D0-4A0342C20D4E}" presName="textNode" presStyleLbl="node1" presStyleIdx="0" presStyleCnt="3">
+        <dgm:presLayoutVars>
+          <dgm:bulletEnabled val="1"/>
+        </dgm:presLayoutVars>
+      </dgm:prSet>
+      <dgm:spPr/>
+    </dgm:pt>
+    <dgm:pt modelId="{3EEA07EC-B9B3-412B-ADA6-144DBDFA38A6}" type="pres">
+      <dgm:prSet presAssocID="{805B52CF-8124-4903-96AC-CDD12D94ECAE}" presName="sibTrans" presStyleCnt="0"/>
+      <dgm:spPr/>
+    </dgm:pt>
+    <dgm:pt modelId="{4FEA9211-38AC-414A-BC60-3561B720BFC4}" type="pres">
+      <dgm:prSet presAssocID="{68E6159D-47D3-4DA7-850F-16C5A8B2557B}" presName="textNode" presStyleLbl="node1" presStyleIdx="1" presStyleCnt="3">
+        <dgm:presLayoutVars>
+          <dgm:bulletEnabled val="1"/>
+        </dgm:presLayoutVars>
+      </dgm:prSet>
+      <dgm:spPr/>
+      <dgm:t>
+        <a:bodyPr/>
+        <a:lstStyle/>
+        <a:p>
+          <a:endParaRPr lang="en-US"/>
+        </a:p>
+      </dgm:t>
+    </dgm:pt>
+    <dgm:pt modelId="{B3B794D4-0C0C-4E5A-B2F5-CBD4A9498ABB}" type="pres">
+      <dgm:prSet presAssocID="{27D2B6A9-FFEB-4530-A7D6-932E5120090B}" presName="sibTrans" presStyleCnt="0"/>
+      <dgm:spPr/>
+    </dgm:pt>
+    <dgm:pt modelId="{A8767C69-185C-4B96-9F00-E550000B9C96}" type="pres">
+      <dgm:prSet presAssocID="{649843C5-9CA6-446A-9731-6DBB3333D83D}" presName="textNode" presStyleLbl="node1" presStyleIdx="2" presStyleCnt="3">
+        <dgm:presLayoutVars>
+          <dgm:bulletEnabled val="1"/>
+        </dgm:presLayoutVars>
+      </dgm:prSet>
+      <dgm:spPr/>
+      <dgm:t>
+        <a:bodyPr/>
+        <a:lstStyle/>
+        <a:p>
+          <a:endParaRPr lang="en-US"/>
+        </a:p>
+      </dgm:t>
+    </dgm:pt>
+  </dgm:ptLst>
+  <dgm:cxnLst>
+    <dgm:cxn modelId="{DA902746-AF7F-4137-88B4-402A8B3C47C2}" type="presOf" srcId="{68E6159D-47D3-4DA7-850F-16C5A8B2557B}" destId="{4FEA9211-38AC-414A-BC60-3561B720BFC4}" srcOrd="0" destOrd="0" presId="urn:microsoft.com/office/officeart/2005/8/layout/hProcess9"/>
+    <dgm:cxn modelId="{4970FBC5-F441-4C6D-A262-9654943E5036}" type="presOf" srcId="{67586C50-7147-4EBB-8399-1183C1E5EE38}" destId="{7E5B0976-430A-4222-BF6E-212E29A31958}" srcOrd="0" destOrd="1" presId="urn:microsoft.com/office/officeart/2005/8/layout/hProcess9"/>
+    <dgm:cxn modelId="{86D2A0D5-A28D-48C1-BDE3-2233ECFAD03C}" type="presOf" srcId="{4677E005-F769-4A9D-91D0-4A0342C20D4E}" destId="{7E5B0976-430A-4222-BF6E-212E29A31958}" srcOrd="0" destOrd="0" presId="urn:microsoft.com/office/officeart/2005/8/layout/hProcess9"/>
+    <dgm:cxn modelId="{A3725179-D09A-4893-A2D2-36CDC20F9792}" srcId="{68E6159D-47D3-4DA7-850F-16C5A8B2557B}" destId="{C5EDC3FF-EA6E-471D-815B-CFA750C4F706}" srcOrd="0" destOrd="0" parTransId="{16B9CBD4-0F9A-4236-B0D3-5A0ECB85FB3B}" sibTransId="{344A6458-A44A-44EA-8474-4E8C98BF094E}"/>
+    <dgm:cxn modelId="{55138F1E-01D3-4CD6-A280-603342D50863}" type="presOf" srcId="{07127421-B1DB-4614-9309-B07B3DE38419}" destId="{A8767C69-185C-4B96-9F00-E550000B9C96}" srcOrd="0" destOrd="1" presId="urn:microsoft.com/office/officeart/2005/8/layout/hProcess9"/>
+    <dgm:cxn modelId="{4A54AE33-0C66-49FC-99EB-FFDAC977245E}" srcId="{50566C3F-72D8-4B9D-B172-562EE4AEA551}" destId="{649843C5-9CA6-446A-9731-6DBB3333D83D}" srcOrd="2" destOrd="0" parTransId="{99AFE336-CE31-4DE5-9007-CE4436580697}" sibTransId="{85BA92F0-E471-482B-A0F0-634B9BD71D69}"/>
+    <dgm:cxn modelId="{87A3A9E0-B465-4BF9-9F27-9F73232DD4FE}" type="presOf" srcId="{E0A1DD6A-FEB4-4EC2-AC2D-D67D26074C6E}" destId="{7E5B0976-430A-4222-BF6E-212E29A31958}" srcOrd="0" destOrd="2" presId="urn:microsoft.com/office/officeart/2005/8/layout/hProcess9"/>
+    <dgm:cxn modelId="{8740DB06-6AAB-43A3-A89B-C3718342AAC7}" type="presOf" srcId="{649843C5-9CA6-446A-9731-6DBB3333D83D}" destId="{A8767C69-185C-4B96-9F00-E550000B9C96}" srcOrd="0" destOrd="0" presId="urn:microsoft.com/office/officeart/2005/8/layout/hProcess9"/>
+    <dgm:cxn modelId="{655DB861-49DE-45FF-A33F-D1137C4FBC81}" srcId="{649843C5-9CA6-446A-9731-6DBB3333D83D}" destId="{5EE58050-B517-41D0-AEA9-591C272A1314}" srcOrd="1" destOrd="0" parTransId="{ED641DF8-5419-45E2-A9B0-D1BD363B1E0F}" sibTransId="{0C6F117D-963A-4A3D-858A-1AE457E575F2}"/>
+    <dgm:cxn modelId="{DA85E77F-25C0-4B59-B057-B0D1C2FBECB9}" type="presOf" srcId="{50566C3F-72D8-4B9D-B172-562EE4AEA551}" destId="{5B5A6F85-06A4-4980-AA69-6E2BABE04015}" srcOrd="0" destOrd="0" presId="urn:microsoft.com/office/officeart/2005/8/layout/hProcess9"/>
+    <dgm:cxn modelId="{A98752BC-1347-4BAA-AB0E-1BACE661B5E0}" srcId="{50566C3F-72D8-4B9D-B172-562EE4AEA551}" destId="{68E6159D-47D3-4DA7-850F-16C5A8B2557B}" srcOrd="1" destOrd="0" parTransId="{69B705C9-B319-4298-9A66-C519206EB941}" sibTransId="{27D2B6A9-FFEB-4530-A7D6-932E5120090B}"/>
+    <dgm:cxn modelId="{D4BBF14E-27AE-4FF6-B245-19D5601F8936}" srcId="{649843C5-9CA6-446A-9731-6DBB3333D83D}" destId="{07127421-B1DB-4614-9309-B07B3DE38419}" srcOrd="0" destOrd="0" parTransId="{02276A56-DDD4-40F2-9278-131ADA994981}" sibTransId="{DEB7D60C-25CB-4E9E-B3CA-3212478EEE2C}"/>
+    <dgm:cxn modelId="{2E22BF80-8ED0-4761-8FA1-330D78DB88AB}" srcId="{68E6159D-47D3-4DA7-850F-16C5A8B2557B}" destId="{C9FC2216-03D6-4316-B115-CE4547F5AF62}" srcOrd="1" destOrd="0" parTransId="{A8357C69-6FE9-45BD-A53B-F02A3AE25AD7}" sibTransId="{992B276D-8F7E-4349-911E-A3D5AF6CBF8C}"/>
+    <dgm:cxn modelId="{EF82A94F-C753-4A75-9FEB-9785A4BBAEC6}" srcId="{4677E005-F769-4A9D-91D0-4A0342C20D4E}" destId="{67586C50-7147-4EBB-8399-1183C1E5EE38}" srcOrd="0" destOrd="0" parTransId="{2FA489F3-BEC8-4CF9-A658-2325CD28E622}" sibTransId="{C9AAE18C-356E-4C9D-A89F-81E06A010621}"/>
+    <dgm:cxn modelId="{019A93FE-5102-4A2B-B8D2-CD97953C1E27}" type="presOf" srcId="{C9FC2216-03D6-4316-B115-CE4547F5AF62}" destId="{4FEA9211-38AC-414A-BC60-3561B720BFC4}" srcOrd="0" destOrd="2" presId="urn:microsoft.com/office/officeart/2005/8/layout/hProcess9"/>
+    <dgm:cxn modelId="{F8CDDE9A-9261-4868-A9EA-BE26FD81A6B8}" type="presOf" srcId="{5EE58050-B517-41D0-AEA9-591C272A1314}" destId="{A8767C69-185C-4B96-9F00-E550000B9C96}" srcOrd="0" destOrd="2" presId="urn:microsoft.com/office/officeart/2005/8/layout/hProcess9"/>
+    <dgm:cxn modelId="{A92F6104-0861-40F9-A77F-A14F60919CE1}" srcId="{4677E005-F769-4A9D-91D0-4A0342C20D4E}" destId="{E0A1DD6A-FEB4-4EC2-AC2D-D67D26074C6E}" srcOrd="1" destOrd="0" parTransId="{078C20F8-997F-449F-AEE8-E7DB9471B662}" sibTransId="{C1B4AC7E-7354-437E-8B60-8EB8E31CF99E}"/>
+    <dgm:cxn modelId="{81D31EA0-1AB1-4529-B5DA-B4FE0AD1306D}" type="presOf" srcId="{C5EDC3FF-EA6E-471D-815B-CFA750C4F706}" destId="{4FEA9211-38AC-414A-BC60-3561B720BFC4}" srcOrd="0" destOrd="1" presId="urn:microsoft.com/office/officeart/2005/8/layout/hProcess9"/>
+    <dgm:cxn modelId="{642ED434-1379-405B-8656-F68376D5B72E}" srcId="{50566C3F-72D8-4B9D-B172-562EE4AEA551}" destId="{4677E005-F769-4A9D-91D0-4A0342C20D4E}" srcOrd="0" destOrd="0" parTransId="{661547F2-BACD-4034-8B7B-94D7D0F7C8B7}" sibTransId="{805B52CF-8124-4903-96AC-CDD12D94ECAE}"/>
+    <dgm:cxn modelId="{5F064828-2353-4B82-AC16-ADE5D197750F}" type="presParOf" srcId="{5B5A6F85-06A4-4980-AA69-6E2BABE04015}" destId="{40F8DB0F-8A4F-48F6-B8FF-02EA328EA6E7}" srcOrd="0" destOrd="0" presId="urn:microsoft.com/office/officeart/2005/8/layout/hProcess9"/>
+    <dgm:cxn modelId="{F8A0DC51-FDAE-4D32-8D71-AA0982B0A263}" type="presParOf" srcId="{5B5A6F85-06A4-4980-AA69-6E2BABE04015}" destId="{97CC1BF7-24DF-4DCA-9ECE-D4E8CEBB1507}" srcOrd="1" destOrd="0" presId="urn:microsoft.com/office/officeart/2005/8/layout/hProcess9"/>
+    <dgm:cxn modelId="{0243F051-E7F4-4E3F-BE97-DF03219C372F}" type="presParOf" srcId="{97CC1BF7-24DF-4DCA-9ECE-D4E8CEBB1507}" destId="{7E5B0976-430A-4222-BF6E-212E29A31958}" srcOrd="0" destOrd="0" presId="urn:microsoft.com/office/officeart/2005/8/layout/hProcess9"/>
+    <dgm:cxn modelId="{F44C8D07-C7E3-4AC2-8378-C9ABDC311DB8}" type="presParOf" srcId="{97CC1BF7-24DF-4DCA-9ECE-D4E8CEBB1507}" destId="{3EEA07EC-B9B3-412B-ADA6-144DBDFA38A6}" srcOrd="1" destOrd="0" presId="urn:microsoft.com/office/officeart/2005/8/layout/hProcess9"/>
+    <dgm:cxn modelId="{EB51DEFD-AFC6-4DDE-8806-536128D0680B}" type="presParOf" srcId="{97CC1BF7-24DF-4DCA-9ECE-D4E8CEBB1507}" destId="{4FEA9211-38AC-414A-BC60-3561B720BFC4}" srcOrd="2" destOrd="0" presId="urn:microsoft.com/office/officeart/2005/8/layout/hProcess9"/>
+    <dgm:cxn modelId="{CAE6AA61-B9CE-4310-B0BB-8EBB22A9B12E}" type="presParOf" srcId="{97CC1BF7-24DF-4DCA-9ECE-D4E8CEBB1507}" destId="{B3B794D4-0C0C-4E5A-B2F5-CBD4A9498ABB}" srcOrd="3" destOrd="0" presId="urn:microsoft.com/office/officeart/2005/8/layout/hProcess9"/>
+    <dgm:cxn modelId="{EDD62504-7C6D-44A0-81EC-891C78AC07F9}" type="presParOf" srcId="{97CC1BF7-24DF-4DCA-9ECE-D4E8CEBB1507}" destId="{A8767C69-185C-4B96-9F00-E550000B9C96}" srcOrd="4" destOrd="0" presId="urn:microsoft.com/office/officeart/2005/8/layout/hProcess9"/>
   </dgm:cxnLst>
   <dgm:bg/>
   <dgm:whole/>
@@ -2472,6 +3793,406 @@
       <dsp:txXfrm>
         <a:off x="652072" y="3799939"/>
         <a:ext cx="2634540" cy="694189"/>
+      </dsp:txXfrm>
+    </dsp:sp>
+  </dsp:spTree>
+</dsp:drawing>
+</file>
+
+<file path=ppt/diagrams/drawing2.xml><?xml version="1.0" encoding="utf-8"?>
+<dsp:drawing xmlns:dgm="http://schemas.openxmlformats.org/drawingml/2006/diagram" xmlns:dsp="http://schemas.microsoft.com/office/drawing/2008/diagram" xmlns:a="http://schemas.openxmlformats.org/drawingml/2006/main">
+  <dsp:spTree>
+    <dsp:nvGrpSpPr>
+      <dsp:cNvPr id="0" name=""/>
+      <dsp:cNvGrpSpPr/>
+    </dsp:nvGrpSpPr>
+    <dsp:grpSpPr/>
+    <dsp:sp modelId="{40F8DB0F-8A4F-48F6-B8FF-02EA328EA6E7}">
+      <dsp:nvSpPr>
+        <dsp:cNvPr id="0" name=""/>
+        <dsp:cNvSpPr/>
+      </dsp:nvSpPr>
+      <dsp:spPr>
+        <a:xfrm>
+          <a:off x="788669" y="0"/>
+          <a:ext cx="8938260" cy="4351338"/>
+        </a:xfrm>
+        <a:prstGeom prst="rightArrow">
+          <a:avLst/>
+        </a:prstGeom>
+        <a:solidFill>
+          <a:schemeClr val="accent5">
+            <a:tint val="40000"/>
+            <a:hueOff val="0"/>
+            <a:satOff val="0"/>
+            <a:lumOff val="0"/>
+            <a:alphaOff val="0"/>
+          </a:schemeClr>
+        </a:solidFill>
+        <a:ln>
+          <a:noFill/>
+        </a:ln>
+        <a:effectLst/>
+      </dsp:spPr>
+      <dsp:style>
+        <a:lnRef idx="0">
+          <a:scrgbClr r="0" g="0" b="0"/>
+        </a:lnRef>
+        <a:fillRef idx="1">
+          <a:scrgbClr r="0" g="0" b="0"/>
+        </a:fillRef>
+        <a:effectRef idx="0">
+          <a:scrgbClr r="0" g="0" b="0"/>
+        </a:effectRef>
+        <a:fontRef idx="minor"/>
+      </dsp:style>
+    </dsp:sp>
+    <dsp:sp modelId="{7E5B0976-430A-4222-BF6E-212E29A31958}">
+      <dsp:nvSpPr>
+        <dsp:cNvPr id="0" name=""/>
+        <dsp:cNvSpPr/>
+      </dsp:nvSpPr>
+      <dsp:spPr>
+        <a:xfrm>
+          <a:off x="6707" y="1305401"/>
+          <a:ext cx="3318280" cy="1740535"/>
+        </a:xfrm>
+        <a:prstGeom prst="roundRect">
+          <a:avLst/>
+        </a:prstGeom>
+        <a:solidFill>
+          <a:schemeClr val="accent5">
+            <a:hueOff val="0"/>
+            <a:satOff val="0"/>
+            <a:lumOff val="0"/>
+            <a:alphaOff val="0"/>
+          </a:schemeClr>
+        </a:solidFill>
+        <a:ln w="12700" cap="flat" cmpd="sng" algn="ctr">
+          <a:solidFill>
+            <a:schemeClr val="lt1">
+              <a:hueOff val="0"/>
+              <a:satOff val="0"/>
+              <a:lumOff val="0"/>
+              <a:alphaOff val="0"/>
+            </a:schemeClr>
+          </a:solidFill>
+          <a:prstDash val="solid"/>
+          <a:miter lim="800000"/>
+        </a:ln>
+        <a:effectLst/>
+      </dsp:spPr>
+      <dsp:style>
+        <a:lnRef idx="2">
+          <a:scrgbClr r="0" g="0" b="0"/>
+        </a:lnRef>
+        <a:fillRef idx="1">
+          <a:scrgbClr r="0" g="0" b="0"/>
+        </a:fillRef>
+        <a:effectRef idx="0">
+          <a:scrgbClr r="0" g="0" b="0"/>
+        </a:effectRef>
+        <a:fontRef idx="minor">
+          <a:schemeClr val="lt1"/>
+        </a:fontRef>
+      </dsp:style>
+      <dsp:txBody>
+        <a:bodyPr spcFirstLastPara="0" vert="horz" wrap="square" lIns="106680" tIns="106680" rIns="106680" bIns="106680" numCol="1" spcCol="1270" anchor="t" anchorCtr="0">
+          <a:noAutofit/>
+        </a:bodyPr>
+        <a:lstStyle/>
+        <a:p>
+          <a:pPr lvl="0" algn="l" defTabSz="1244600">
+            <a:lnSpc>
+              <a:spcPct val="90000"/>
+            </a:lnSpc>
+            <a:spcBef>
+              <a:spcPct val="0"/>
+            </a:spcBef>
+            <a:spcAft>
+              <a:spcPct val="35000"/>
+            </a:spcAft>
+          </a:pPr>
+          <a:r>
+            <a:rPr lang="en-US" sz="2800" kern="1200" dirty="0" smtClean="0"/>
+            <a:t>Article Metadata</a:t>
+          </a:r>
+          <a:endParaRPr lang="en-US" sz="2800" kern="1200" dirty="0"/>
+        </a:p>
+        <a:p>
+          <a:pPr marL="228600" lvl="1" indent="-228600" algn="l" defTabSz="977900">
+            <a:lnSpc>
+              <a:spcPct val="90000"/>
+            </a:lnSpc>
+            <a:spcBef>
+              <a:spcPct val="0"/>
+            </a:spcBef>
+            <a:spcAft>
+              <a:spcPct val="15000"/>
+            </a:spcAft>
+            <a:buChar char="••"/>
+          </a:pPr>
+          <a:r>
+            <a:rPr lang="en-US" sz="2200" kern="1200" dirty="0" smtClean="0"/>
+            <a:t>NewsAPI</a:t>
+          </a:r>
+          <a:endParaRPr lang="en-US" sz="2200" kern="1200" dirty="0"/>
+        </a:p>
+        <a:p>
+          <a:pPr marL="228600" lvl="1" indent="-228600" algn="l" defTabSz="977900">
+            <a:lnSpc>
+              <a:spcPct val="90000"/>
+            </a:lnSpc>
+            <a:spcBef>
+              <a:spcPct val="0"/>
+            </a:spcBef>
+            <a:spcAft>
+              <a:spcPct val="15000"/>
+            </a:spcAft>
+            <a:buChar char="••"/>
+          </a:pPr>
+          <a:r>
+            <a:rPr lang="en-US" sz="2200" kern="1200" dirty="0" smtClean="0"/>
+            <a:t>Topic: Immigration</a:t>
+          </a:r>
+          <a:endParaRPr lang="en-US" sz="2200" kern="1200" dirty="0"/>
+        </a:p>
+      </dsp:txBody>
+      <dsp:txXfrm>
+        <a:off x="91673" y="1390367"/>
+        <a:ext cx="3148348" cy="1570603"/>
+      </dsp:txXfrm>
+    </dsp:sp>
+    <dsp:sp modelId="{4FEA9211-38AC-414A-BC60-3561B720BFC4}">
+      <dsp:nvSpPr>
+        <dsp:cNvPr id="0" name=""/>
+        <dsp:cNvSpPr/>
+      </dsp:nvSpPr>
+      <dsp:spPr>
+        <a:xfrm>
+          <a:off x="3598659" y="1305401"/>
+          <a:ext cx="3318280" cy="1740535"/>
+        </a:xfrm>
+        <a:prstGeom prst="roundRect">
+          <a:avLst/>
+        </a:prstGeom>
+        <a:solidFill>
+          <a:schemeClr val="accent5">
+            <a:hueOff val="-3676672"/>
+            <a:satOff val="-5114"/>
+            <a:lumOff val="-1961"/>
+            <a:alphaOff val="0"/>
+          </a:schemeClr>
+        </a:solidFill>
+        <a:ln w="12700" cap="flat" cmpd="sng" algn="ctr">
+          <a:solidFill>
+            <a:schemeClr val="lt1">
+              <a:hueOff val="0"/>
+              <a:satOff val="0"/>
+              <a:lumOff val="0"/>
+              <a:alphaOff val="0"/>
+            </a:schemeClr>
+          </a:solidFill>
+          <a:prstDash val="solid"/>
+          <a:miter lim="800000"/>
+        </a:ln>
+        <a:effectLst/>
+      </dsp:spPr>
+      <dsp:style>
+        <a:lnRef idx="2">
+          <a:scrgbClr r="0" g="0" b="0"/>
+        </a:lnRef>
+        <a:fillRef idx="1">
+          <a:scrgbClr r="0" g="0" b="0"/>
+        </a:fillRef>
+        <a:effectRef idx="0">
+          <a:scrgbClr r="0" g="0" b="0"/>
+        </a:effectRef>
+        <a:fontRef idx="minor">
+          <a:schemeClr val="lt1"/>
+        </a:fontRef>
+      </dsp:style>
+      <dsp:txBody>
+        <a:bodyPr spcFirstLastPara="0" vert="horz" wrap="square" lIns="106680" tIns="106680" rIns="106680" bIns="106680" numCol="1" spcCol="1270" anchor="t" anchorCtr="0">
+          <a:noAutofit/>
+        </a:bodyPr>
+        <a:lstStyle/>
+        <a:p>
+          <a:pPr lvl="0" algn="l" defTabSz="1244600">
+            <a:lnSpc>
+              <a:spcPct val="90000"/>
+            </a:lnSpc>
+            <a:spcBef>
+              <a:spcPct val="0"/>
+            </a:spcBef>
+            <a:spcAft>
+              <a:spcPct val="35000"/>
+            </a:spcAft>
+          </a:pPr>
+          <a:r>
+            <a:rPr lang="en-US" sz="2800" kern="1200" dirty="0" smtClean="0"/>
+            <a:t>Full Text</a:t>
+          </a:r>
+          <a:endParaRPr lang="en-US" sz="2800" kern="1200" dirty="0"/>
+        </a:p>
+        <a:p>
+          <a:pPr marL="228600" lvl="1" indent="-228600" algn="l" defTabSz="977900">
+            <a:lnSpc>
+              <a:spcPct val="90000"/>
+            </a:lnSpc>
+            <a:spcBef>
+              <a:spcPct val="0"/>
+            </a:spcBef>
+            <a:spcAft>
+              <a:spcPct val="15000"/>
+            </a:spcAft>
+            <a:buChar char="••"/>
+          </a:pPr>
+          <a:r>
+            <a:rPr lang="en-US" sz="2200" kern="1200" dirty="0" smtClean="0"/>
+            <a:t>Newspaper3k</a:t>
+          </a:r>
+          <a:endParaRPr lang="en-US" sz="2200" kern="1200" dirty="0"/>
+        </a:p>
+        <a:p>
+          <a:pPr marL="228600" lvl="1" indent="-228600" algn="l" defTabSz="977900">
+            <a:lnSpc>
+              <a:spcPct val="90000"/>
+            </a:lnSpc>
+            <a:spcBef>
+              <a:spcPct val="0"/>
+            </a:spcBef>
+            <a:spcAft>
+              <a:spcPct val="15000"/>
+            </a:spcAft>
+            <a:buChar char="••"/>
+          </a:pPr>
+          <a:r>
+            <a:rPr lang="en-US" sz="2200" kern="1200" dirty="0" smtClean="0"/>
+            <a:t>URL’s from NewsAPI</a:t>
+          </a:r>
+          <a:endParaRPr lang="en-US" sz="2200" kern="1200" dirty="0"/>
+        </a:p>
+      </dsp:txBody>
+      <dsp:txXfrm>
+        <a:off x="3683625" y="1390367"/>
+        <a:ext cx="3148348" cy="1570603"/>
+      </dsp:txXfrm>
+    </dsp:sp>
+    <dsp:sp modelId="{A8767C69-185C-4B96-9F00-E550000B9C96}">
+      <dsp:nvSpPr>
+        <dsp:cNvPr id="0" name=""/>
+        <dsp:cNvSpPr/>
+      </dsp:nvSpPr>
+      <dsp:spPr>
+        <a:xfrm>
+          <a:off x="7190612" y="1305401"/>
+          <a:ext cx="3318280" cy="1740535"/>
+        </a:xfrm>
+        <a:prstGeom prst="roundRect">
+          <a:avLst/>
+        </a:prstGeom>
+        <a:solidFill>
+          <a:schemeClr val="accent5">
+            <a:hueOff val="-7353344"/>
+            <a:satOff val="-10228"/>
+            <a:lumOff val="-3922"/>
+            <a:alphaOff val="0"/>
+          </a:schemeClr>
+        </a:solidFill>
+        <a:ln w="12700" cap="flat" cmpd="sng" algn="ctr">
+          <a:solidFill>
+            <a:schemeClr val="lt1">
+              <a:hueOff val="0"/>
+              <a:satOff val="0"/>
+              <a:lumOff val="0"/>
+              <a:alphaOff val="0"/>
+            </a:schemeClr>
+          </a:solidFill>
+          <a:prstDash val="solid"/>
+          <a:miter lim="800000"/>
+        </a:ln>
+        <a:effectLst/>
+      </dsp:spPr>
+      <dsp:style>
+        <a:lnRef idx="2">
+          <a:scrgbClr r="0" g="0" b="0"/>
+        </a:lnRef>
+        <a:fillRef idx="1">
+          <a:scrgbClr r="0" g="0" b="0"/>
+        </a:fillRef>
+        <a:effectRef idx="0">
+          <a:scrgbClr r="0" g="0" b="0"/>
+        </a:effectRef>
+        <a:fontRef idx="minor">
+          <a:schemeClr val="lt1"/>
+        </a:fontRef>
+      </dsp:style>
+      <dsp:txBody>
+        <a:bodyPr spcFirstLastPara="0" vert="horz" wrap="square" lIns="106680" tIns="106680" rIns="106680" bIns="106680" numCol="1" spcCol="1270" anchor="t" anchorCtr="0">
+          <a:noAutofit/>
+        </a:bodyPr>
+        <a:lstStyle/>
+        <a:p>
+          <a:pPr lvl="0" algn="l" defTabSz="1244600">
+            <a:lnSpc>
+              <a:spcPct val="90000"/>
+            </a:lnSpc>
+            <a:spcBef>
+              <a:spcPct val="0"/>
+            </a:spcBef>
+            <a:spcAft>
+              <a:spcPct val="35000"/>
+            </a:spcAft>
+          </a:pPr>
+          <a:r>
+            <a:rPr lang="en-US" sz="2800" kern="1200" dirty="0" smtClean="0"/>
+            <a:t>Analysis</a:t>
+          </a:r>
+          <a:endParaRPr lang="en-US" sz="2800" kern="1200" dirty="0"/>
+        </a:p>
+        <a:p>
+          <a:pPr marL="228600" lvl="1" indent="-228600" algn="l" defTabSz="977900">
+            <a:lnSpc>
+              <a:spcPct val="90000"/>
+            </a:lnSpc>
+            <a:spcBef>
+              <a:spcPct val="0"/>
+            </a:spcBef>
+            <a:spcAft>
+              <a:spcPct val="15000"/>
+            </a:spcAft>
+            <a:buChar char="••"/>
+          </a:pPr>
+          <a:r>
+            <a:rPr lang="en-US" sz="2200" kern="1200" dirty="0" smtClean="0"/>
+            <a:t>Sentiment (NLTK Vader)</a:t>
+          </a:r>
+          <a:endParaRPr lang="en-US" sz="2200" kern="1200" dirty="0"/>
+        </a:p>
+        <a:p>
+          <a:pPr marL="228600" lvl="1" indent="-228600" algn="l" defTabSz="977900">
+            <a:lnSpc>
+              <a:spcPct val="90000"/>
+            </a:lnSpc>
+            <a:spcBef>
+              <a:spcPct val="0"/>
+            </a:spcBef>
+            <a:spcAft>
+              <a:spcPct val="15000"/>
+            </a:spcAft>
+            <a:buChar char="••"/>
+          </a:pPr>
+          <a:r>
+            <a:rPr lang="en-US" sz="2200" kern="1200" dirty="0" smtClean="0"/>
+            <a:t>Bigrams (NLTK)</a:t>
+          </a:r>
+          <a:endParaRPr lang="en-US" sz="2200" kern="1200" dirty="0"/>
+        </a:p>
+      </dsp:txBody>
+      <dsp:txXfrm>
+        <a:off x="7275578" y="1390367"/>
+        <a:ext cx="3148348" cy="1570603"/>
       </dsp:txXfrm>
     </dsp:sp>
   </dsp:spTree>
@@ -3639,7 +5360,1195 @@
 </dgm:layoutDef>
 </file>
 
+<file path=ppt/diagrams/layout2.xml><?xml version="1.0" encoding="utf-8"?>
+<dgm:layoutDef xmlns:dgm="http://schemas.openxmlformats.org/drawingml/2006/diagram" xmlns:a="http://schemas.openxmlformats.org/drawingml/2006/main" uniqueId="urn:microsoft.com/office/officeart/2005/8/layout/hProcess9">
+  <dgm:title val=""/>
+  <dgm:desc val=""/>
+  <dgm:catLst>
+    <dgm:cat type="process" pri="5000"/>
+    <dgm:cat type="convert" pri="13000"/>
+  </dgm:catLst>
+  <dgm:sampData useDef="1">
+    <dgm:dataModel>
+      <dgm:ptLst/>
+      <dgm:bg/>
+      <dgm:whole/>
+    </dgm:dataModel>
+  </dgm:sampData>
+  <dgm:styleData>
+    <dgm:dataModel>
+      <dgm:ptLst>
+        <dgm:pt modelId="0" type="doc"/>
+        <dgm:pt modelId="1"/>
+        <dgm:pt modelId="2"/>
+      </dgm:ptLst>
+      <dgm:cxnLst>
+        <dgm:cxn modelId="3" srcId="0" destId="1" srcOrd="0" destOrd="0"/>
+        <dgm:cxn modelId="4" srcId="0" destId="2" srcOrd="1" destOrd="0"/>
+      </dgm:cxnLst>
+      <dgm:bg/>
+      <dgm:whole/>
+    </dgm:dataModel>
+  </dgm:styleData>
+  <dgm:clrData>
+    <dgm:dataModel>
+      <dgm:ptLst>
+        <dgm:pt modelId="0" type="doc"/>
+        <dgm:pt modelId="1"/>
+        <dgm:pt modelId="2"/>
+        <dgm:pt modelId="3"/>
+        <dgm:pt modelId="4"/>
+      </dgm:ptLst>
+      <dgm:cxnLst>
+        <dgm:cxn modelId="5" srcId="0" destId="1" srcOrd="0" destOrd="0"/>
+        <dgm:cxn modelId="6" srcId="0" destId="2" srcOrd="1" destOrd="0"/>
+        <dgm:cxn modelId="7" srcId="0" destId="3" srcOrd="2" destOrd="0"/>
+        <dgm:cxn modelId="8" srcId="0" destId="4" srcOrd="3" destOrd="0"/>
+      </dgm:cxnLst>
+      <dgm:bg/>
+      <dgm:whole/>
+    </dgm:dataModel>
+  </dgm:clrData>
+  <dgm:layoutNode name="CompostProcess">
+    <dgm:varLst>
+      <dgm:dir/>
+      <dgm:resizeHandles val="exact"/>
+    </dgm:varLst>
+    <dgm:alg type="composite">
+      <dgm:param type="horzAlign" val="ctr"/>
+      <dgm:param type="vertAlign" val="mid"/>
+    </dgm:alg>
+    <dgm:shape xmlns:r="http://schemas.openxmlformats.org/officeDocument/2006/relationships" r:blip="">
+      <dgm:adjLst/>
+    </dgm:shape>
+    <dgm:presOf/>
+    <dgm:constrLst>
+      <dgm:constr type="w" for="ch" forName="arrow" refType="w" fact="0.85"/>
+      <dgm:constr type="h" for="ch" forName="arrow" refType="h"/>
+      <dgm:constr type="ctrX" for="ch" forName="arrow" refType="w" fact="0.5"/>
+      <dgm:constr type="ctrY" for="ch" forName="arrow" refType="h" fact="0.5"/>
+      <dgm:constr type="w" for="ch" forName="linearProcess" refType="w"/>
+      <dgm:constr type="h" for="ch" forName="linearProcess" refType="h" fact="0.4"/>
+      <dgm:constr type="ctrX" for="ch" forName="linearProcess" refType="w" fact="0.5"/>
+      <dgm:constr type="ctrY" for="ch" forName="linearProcess" refType="h" fact="0.5"/>
+    </dgm:constrLst>
+    <dgm:ruleLst/>
+    <dgm:layoutNode name="arrow" styleLbl="bgShp">
+      <dgm:alg type="sp"/>
+      <dgm:choose name="Name0">
+        <dgm:if name="Name1" func="var" arg="dir" op="equ" val="norm">
+          <dgm:shape xmlns:r="http://schemas.openxmlformats.org/officeDocument/2006/relationships" type="rightArrow" r:blip="">
+            <dgm:adjLst/>
+          </dgm:shape>
+        </dgm:if>
+        <dgm:else name="Name2">
+          <dgm:shape xmlns:r="http://schemas.openxmlformats.org/officeDocument/2006/relationships" type="leftArrow" r:blip="">
+            <dgm:adjLst/>
+          </dgm:shape>
+        </dgm:else>
+      </dgm:choose>
+      <dgm:presOf/>
+      <dgm:constrLst/>
+      <dgm:ruleLst/>
+    </dgm:layoutNode>
+    <dgm:layoutNode name="linearProcess">
+      <dgm:choose name="Name3">
+        <dgm:if name="Name4" func="var" arg="dir" op="equ" val="norm">
+          <dgm:alg type="lin"/>
+        </dgm:if>
+        <dgm:else name="Name5">
+          <dgm:alg type="lin">
+            <dgm:param type="linDir" val="fromR"/>
+          </dgm:alg>
+        </dgm:else>
+      </dgm:choose>
+      <dgm:shape xmlns:r="http://schemas.openxmlformats.org/officeDocument/2006/relationships" r:blip="">
+        <dgm:adjLst/>
+      </dgm:shape>
+      <dgm:presOf/>
+      <dgm:constrLst>
+        <dgm:constr type="userA" for="ch" ptType="node" refType="w"/>
+        <dgm:constr type="h" for="ch" ptType="node" refType="h"/>
+        <dgm:constr type="w" for="ch" ptType="node" op="equ"/>
+        <dgm:constr type="w" for="ch" forName="sibTrans" refType="w" fact="0.05"/>
+        <dgm:constr type="primFontSz" for="ch" ptType="node" op="equ" val="65"/>
+      </dgm:constrLst>
+      <dgm:ruleLst/>
+      <dgm:forEach name="Name6" axis="ch" ptType="node">
+        <dgm:layoutNode name="textNode" styleLbl="node1">
+          <dgm:varLst>
+            <dgm:bulletEnabled val="1"/>
+          </dgm:varLst>
+          <dgm:alg type="tx"/>
+          <dgm:shape xmlns:r="http://schemas.openxmlformats.org/officeDocument/2006/relationships" type="roundRect" r:blip="">
+            <dgm:adjLst/>
+          </dgm:shape>
+          <dgm:presOf axis="desOrSelf" ptType="node"/>
+          <dgm:constrLst>
+            <dgm:constr type="userA"/>
+            <dgm:constr type="w" refType="userA" fact="0.3"/>
+            <dgm:constr type="tMarg" refType="primFontSz" fact="0.3"/>
+            <dgm:constr type="bMarg" refType="primFontSz" fact="0.3"/>
+            <dgm:constr type="lMarg" refType="primFontSz" fact="0.3"/>
+            <dgm:constr type="rMarg" refType="primFontSz" fact="0.3"/>
+          </dgm:constrLst>
+          <dgm:ruleLst>
+            <dgm:rule type="w" val="NaN" fact="1" max="NaN"/>
+            <dgm:rule type="primFontSz" val="5" fact="NaN" max="NaN"/>
+          </dgm:ruleLst>
+        </dgm:layoutNode>
+        <dgm:forEach name="Name7" axis="followSib" ptType="sibTrans" cnt="1">
+          <dgm:layoutNode name="sibTrans">
+            <dgm:alg type="sp"/>
+            <dgm:shape xmlns:r="http://schemas.openxmlformats.org/officeDocument/2006/relationships" r:blip="">
+              <dgm:adjLst/>
+            </dgm:shape>
+            <dgm:presOf/>
+            <dgm:constrLst/>
+            <dgm:ruleLst/>
+          </dgm:layoutNode>
+        </dgm:forEach>
+      </dgm:forEach>
+    </dgm:layoutNode>
+  </dgm:layoutNode>
+</dgm:layoutDef>
+</file>
+
 <file path=ppt/diagrams/quickStyle1.xml><?xml version="1.0" encoding="utf-8"?>
+<dgm:styleDef xmlns:dgm="http://schemas.openxmlformats.org/drawingml/2006/diagram" xmlns:a="http://schemas.openxmlformats.org/drawingml/2006/main" uniqueId="urn:microsoft.com/office/officeart/2005/8/quickstyle/simple1">
+  <dgm:title val=""/>
+  <dgm:desc val=""/>
+  <dgm:catLst>
+    <dgm:cat type="simple" pri="10100"/>
+  </dgm:catLst>
+  <dgm:scene3d>
+    <a:camera prst="orthographicFront"/>
+    <a:lightRig rig="threePt" dir="t"/>
+  </dgm:scene3d>
+  <dgm:styleLbl name="node0">
+    <dgm:scene3d>
+      <a:camera prst="orthographicFront"/>
+      <a:lightRig rig="threePt" dir="t"/>
+    </dgm:scene3d>
+    <dgm:sp3d/>
+    <dgm:txPr/>
+    <dgm:style>
+      <a:lnRef idx="2">
+        <a:scrgbClr r="0" g="0" b="0"/>
+      </a:lnRef>
+      <a:fillRef idx="1">
+        <a:scrgbClr r="0" g="0" b="0"/>
+      </a:fillRef>
+      <a:effectRef idx="0">
+        <a:scrgbClr r="0" g="0" b="0"/>
+      </a:effectRef>
+      <a:fontRef idx="minor">
+        <a:schemeClr val="lt1"/>
+      </a:fontRef>
+    </dgm:style>
+  </dgm:styleLbl>
+  <dgm:styleLbl name="lnNode1">
+    <dgm:scene3d>
+      <a:camera prst="orthographicFront"/>
+      <a:lightRig rig="threePt" dir="t"/>
+    </dgm:scene3d>
+    <dgm:sp3d/>
+    <dgm:txPr/>
+    <dgm:style>
+      <a:lnRef idx="2">
+        <a:scrgbClr r="0" g="0" b="0"/>
+      </a:lnRef>
+      <a:fillRef idx="1">
+        <a:scrgbClr r="0" g="0" b="0"/>
+      </a:fillRef>
+      <a:effectRef idx="0">
+        <a:scrgbClr r="0" g="0" b="0"/>
+      </a:effectRef>
+      <a:fontRef idx="minor">
+        <a:schemeClr val="lt1"/>
+      </a:fontRef>
+    </dgm:style>
+  </dgm:styleLbl>
+  <dgm:styleLbl name="vennNode1">
+    <dgm:scene3d>
+      <a:camera prst="orthographicFront"/>
+      <a:lightRig rig="threePt" dir="t"/>
+    </dgm:scene3d>
+    <dgm:sp3d/>
+    <dgm:txPr/>
+    <dgm:style>
+      <a:lnRef idx="2">
+        <a:scrgbClr r="0" g="0" b="0"/>
+      </a:lnRef>
+      <a:fillRef idx="1">
+        <a:scrgbClr r="0" g="0" b="0"/>
+      </a:fillRef>
+      <a:effectRef idx="0">
+        <a:scrgbClr r="0" g="0" b="0"/>
+      </a:effectRef>
+      <a:fontRef idx="minor">
+        <a:schemeClr val="tx1"/>
+      </a:fontRef>
+    </dgm:style>
+  </dgm:styleLbl>
+  <dgm:styleLbl name="alignNode1">
+    <dgm:scene3d>
+      <a:camera prst="orthographicFront"/>
+      <a:lightRig rig="threePt" dir="t"/>
+    </dgm:scene3d>
+    <dgm:sp3d/>
+    <dgm:txPr/>
+    <dgm:style>
+      <a:lnRef idx="2">
+        <a:scrgbClr r="0" g="0" b="0"/>
+      </a:lnRef>
+      <a:fillRef idx="1">
+        <a:scrgbClr r="0" g="0" b="0"/>
+      </a:fillRef>
+      <a:effectRef idx="0">
+        <a:scrgbClr r="0" g="0" b="0"/>
+      </a:effectRef>
+      <a:fontRef idx="minor">
+        <a:schemeClr val="lt1"/>
+      </a:fontRef>
+    </dgm:style>
+  </dgm:styleLbl>
+  <dgm:styleLbl name="node1">
+    <dgm:scene3d>
+      <a:camera prst="orthographicFront"/>
+      <a:lightRig rig="threePt" dir="t"/>
+    </dgm:scene3d>
+    <dgm:sp3d/>
+    <dgm:txPr/>
+    <dgm:style>
+      <a:lnRef idx="2">
+        <a:scrgbClr r="0" g="0" b="0"/>
+      </a:lnRef>
+      <a:fillRef idx="1">
+        <a:scrgbClr r="0" g="0" b="0"/>
+      </a:fillRef>
+      <a:effectRef idx="0">
+        <a:scrgbClr r="0" g="0" b="0"/>
+      </a:effectRef>
+      <a:fontRef idx="minor">
+        <a:schemeClr val="lt1"/>
+      </a:fontRef>
+    </dgm:style>
+  </dgm:styleLbl>
+  <dgm:styleLbl name="node2">
+    <dgm:scene3d>
+      <a:camera prst="orthographicFront"/>
+      <a:lightRig rig="threePt" dir="t"/>
+    </dgm:scene3d>
+    <dgm:sp3d/>
+    <dgm:txPr/>
+    <dgm:style>
+      <a:lnRef idx="2">
+        <a:scrgbClr r="0" g="0" b="0"/>
+      </a:lnRef>
+      <a:fillRef idx="1">
+        <a:scrgbClr r="0" g="0" b="0"/>
+      </a:fillRef>
+      <a:effectRef idx="0">
+        <a:scrgbClr r="0" g="0" b="0"/>
+      </a:effectRef>
+      <a:fontRef idx="minor">
+        <a:schemeClr val="lt1"/>
+      </a:fontRef>
+    </dgm:style>
+  </dgm:styleLbl>
+  <dgm:styleLbl name="node3">
+    <dgm:scene3d>
+      <a:camera prst="orthographicFront"/>
+      <a:lightRig rig="threePt" dir="t"/>
+    </dgm:scene3d>
+    <dgm:sp3d/>
+    <dgm:txPr/>
+    <dgm:style>
+      <a:lnRef idx="2">
+        <a:scrgbClr r="0" g="0" b="0"/>
+      </a:lnRef>
+      <a:fillRef idx="1">
+        <a:scrgbClr r="0" g="0" b="0"/>
+      </a:fillRef>
+      <a:effectRef idx="0">
+        <a:scrgbClr r="0" g="0" b="0"/>
+      </a:effectRef>
+      <a:fontRef idx="minor">
+        <a:schemeClr val="lt1"/>
+      </a:fontRef>
+    </dgm:style>
+  </dgm:styleLbl>
+  <dgm:styleLbl name="node4">
+    <dgm:scene3d>
+      <a:camera prst="orthographicFront"/>
+      <a:lightRig rig="threePt" dir="t"/>
+    </dgm:scene3d>
+    <dgm:sp3d/>
+    <dgm:txPr/>
+    <dgm:style>
+      <a:lnRef idx="2">
+        <a:scrgbClr r="0" g="0" b="0"/>
+      </a:lnRef>
+      <a:fillRef idx="1">
+        <a:scrgbClr r="0" g="0" b="0"/>
+      </a:fillRef>
+      <a:effectRef idx="0">
+        <a:scrgbClr r="0" g="0" b="0"/>
+      </a:effectRef>
+      <a:fontRef idx="minor">
+        <a:schemeClr val="lt1"/>
+      </a:fontRef>
+    </dgm:style>
+  </dgm:styleLbl>
+  <dgm:styleLbl name="fgImgPlace1">
+    <dgm:scene3d>
+      <a:camera prst="orthographicFront"/>
+      <a:lightRig rig="threePt" dir="t"/>
+    </dgm:scene3d>
+    <dgm:sp3d/>
+    <dgm:txPr/>
+    <dgm:style>
+      <a:lnRef idx="2">
+        <a:scrgbClr r="0" g="0" b="0"/>
+      </a:lnRef>
+      <a:fillRef idx="1">
+        <a:scrgbClr r="0" g="0" b="0"/>
+      </a:fillRef>
+      <a:effectRef idx="0">
+        <a:scrgbClr r="0" g="0" b="0"/>
+      </a:effectRef>
+      <a:fontRef idx="minor"/>
+    </dgm:style>
+  </dgm:styleLbl>
+  <dgm:styleLbl name="alignImgPlace1">
+    <dgm:scene3d>
+      <a:camera prst="orthographicFront"/>
+      <a:lightRig rig="threePt" dir="t"/>
+    </dgm:scene3d>
+    <dgm:sp3d/>
+    <dgm:txPr/>
+    <dgm:style>
+      <a:lnRef idx="2">
+        <a:scrgbClr r="0" g="0" b="0"/>
+      </a:lnRef>
+      <a:fillRef idx="1">
+        <a:scrgbClr r="0" g="0" b="0"/>
+      </a:fillRef>
+      <a:effectRef idx="0">
+        <a:scrgbClr r="0" g="0" b="0"/>
+      </a:effectRef>
+      <a:fontRef idx="minor"/>
+    </dgm:style>
+  </dgm:styleLbl>
+  <dgm:styleLbl name="bgImgPlace1">
+    <dgm:scene3d>
+      <a:camera prst="orthographicFront"/>
+      <a:lightRig rig="threePt" dir="t"/>
+    </dgm:scene3d>
+    <dgm:sp3d/>
+    <dgm:txPr/>
+    <dgm:style>
+      <a:lnRef idx="2">
+        <a:scrgbClr r="0" g="0" b="0"/>
+      </a:lnRef>
+      <a:fillRef idx="1">
+        <a:scrgbClr r="0" g="0" b="0"/>
+      </a:fillRef>
+      <a:effectRef idx="0">
+        <a:scrgbClr r="0" g="0" b="0"/>
+      </a:effectRef>
+      <a:fontRef idx="minor"/>
+    </dgm:style>
+  </dgm:styleLbl>
+  <dgm:styleLbl name="sibTrans2D1">
+    <dgm:scene3d>
+      <a:camera prst="orthographicFront"/>
+      <a:lightRig rig="threePt" dir="t"/>
+    </dgm:scene3d>
+    <dgm:sp3d/>
+    <dgm:txPr/>
+    <dgm:style>
+      <a:lnRef idx="0">
+        <a:scrgbClr r="0" g="0" b="0"/>
+      </a:lnRef>
+      <a:fillRef idx="1">
+        <a:scrgbClr r="0" g="0" b="0"/>
+      </a:fillRef>
+      <a:effectRef idx="0">
+        <a:scrgbClr r="0" g="0" b="0"/>
+      </a:effectRef>
+      <a:fontRef idx="minor">
+        <a:schemeClr val="lt1"/>
+      </a:fontRef>
+    </dgm:style>
+  </dgm:styleLbl>
+  <dgm:styleLbl name="fgSibTrans2D1">
+    <dgm:scene3d>
+      <a:camera prst="orthographicFront"/>
+      <a:lightRig rig="threePt" dir="t"/>
+    </dgm:scene3d>
+    <dgm:sp3d/>
+    <dgm:txPr/>
+    <dgm:style>
+      <a:lnRef idx="0">
+        <a:scrgbClr r="0" g="0" b="0"/>
+      </a:lnRef>
+      <a:fillRef idx="1">
+        <a:scrgbClr r="0" g="0" b="0"/>
+      </a:fillRef>
+      <a:effectRef idx="0">
+        <a:scrgbClr r="0" g="0" b="0"/>
+      </a:effectRef>
+      <a:fontRef idx="minor">
+        <a:schemeClr val="lt1"/>
+      </a:fontRef>
+    </dgm:style>
+  </dgm:styleLbl>
+  <dgm:styleLbl name="bgSibTrans2D1">
+    <dgm:scene3d>
+      <a:camera prst="orthographicFront"/>
+      <a:lightRig rig="threePt" dir="t"/>
+    </dgm:scene3d>
+    <dgm:sp3d/>
+    <dgm:txPr/>
+    <dgm:style>
+      <a:lnRef idx="0">
+        <a:scrgbClr r="0" g="0" b="0"/>
+      </a:lnRef>
+      <a:fillRef idx="1">
+        <a:scrgbClr r="0" g="0" b="0"/>
+      </a:fillRef>
+      <a:effectRef idx="0">
+        <a:scrgbClr r="0" g="0" b="0"/>
+      </a:effectRef>
+      <a:fontRef idx="minor">
+        <a:schemeClr val="lt1"/>
+      </a:fontRef>
+    </dgm:style>
+  </dgm:styleLbl>
+  <dgm:styleLbl name="sibTrans1D1">
+    <dgm:scene3d>
+      <a:camera prst="orthographicFront"/>
+      <a:lightRig rig="threePt" dir="t"/>
+    </dgm:scene3d>
+    <dgm:sp3d/>
+    <dgm:txPr/>
+    <dgm:style>
+      <a:lnRef idx="1">
+        <a:scrgbClr r="0" g="0" b="0"/>
+      </a:lnRef>
+      <a:fillRef idx="0">
+        <a:scrgbClr r="0" g="0" b="0"/>
+      </a:fillRef>
+      <a:effectRef idx="0">
+        <a:scrgbClr r="0" g="0" b="0"/>
+      </a:effectRef>
+      <a:fontRef idx="minor"/>
+    </dgm:style>
+  </dgm:styleLbl>
+  <dgm:styleLbl name="callout">
+    <dgm:scene3d>
+      <a:camera prst="orthographicFront"/>
+      <a:lightRig rig="threePt" dir="t"/>
+    </dgm:scene3d>
+    <dgm:sp3d/>
+    <dgm:txPr/>
+    <dgm:style>
+      <a:lnRef idx="2">
+        <a:scrgbClr r="0" g="0" b="0"/>
+      </a:lnRef>
+      <a:fillRef idx="1">
+        <a:scrgbClr r="0" g="0" b="0"/>
+      </a:fillRef>
+      <a:effectRef idx="0">
+        <a:scrgbClr r="0" g="0" b="0"/>
+      </a:effectRef>
+      <a:fontRef idx="minor"/>
+    </dgm:style>
+  </dgm:styleLbl>
+  <dgm:styleLbl name="asst0">
+    <dgm:scene3d>
+      <a:camera prst="orthographicFront"/>
+      <a:lightRig rig="threePt" dir="t"/>
+    </dgm:scene3d>
+    <dgm:sp3d/>
+    <dgm:txPr/>
+    <dgm:style>
+      <a:lnRef idx="2">
+        <a:scrgbClr r="0" g="0" b="0"/>
+      </a:lnRef>
+      <a:fillRef idx="1">
+        <a:scrgbClr r="0" g="0" b="0"/>
+      </a:fillRef>
+      <a:effectRef idx="0">
+        <a:scrgbClr r="0" g="0" b="0"/>
+      </a:effectRef>
+      <a:fontRef idx="minor">
+        <a:schemeClr val="lt1"/>
+      </a:fontRef>
+    </dgm:style>
+  </dgm:styleLbl>
+  <dgm:styleLbl name="asst1">
+    <dgm:scene3d>
+      <a:camera prst="orthographicFront"/>
+      <a:lightRig rig="threePt" dir="t"/>
+    </dgm:scene3d>
+    <dgm:sp3d/>
+    <dgm:txPr/>
+    <dgm:style>
+      <a:lnRef idx="2">
+        <a:scrgbClr r="0" g="0" b="0"/>
+      </a:lnRef>
+      <a:fillRef idx="1">
+        <a:scrgbClr r="0" g="0" b="0"/>
+      </a:fillRef>
+      <a:effectRef idx="0">
+        <a:scrgbClr r="0" g="0" b="0"/>
+      </a:effectRef>
+      <a:fontRef idx="minor">
+        <a:schemeClr val="lt1"/>
+      </a:fontRef>
+    </dgm:style>
+  </dgm:styleLbl>
+  <dgm:styleLbl name="asst2">
+    <dgm:scene3d>
+      <a:camera prst="orthographicFront"/>
+      <a:lightRig rig="threePt" dir="t"/>
+    </dgm:scene3d>
+    <dgm:sp3d/>
+    <dgm:txPr/>
+    <dgm:style>
+      <a:lnRef idx="2">
+        <a:scrgbClr r="0" g="0" b="0"/>
+      </a:lnRef>
+      <a:fillRef idx="1">
+        <a:scrgbClr r="0" g="0" b="0"/>
+      </a:fillRef>
+      <a:effectRef idx="0">
+        <a:scrgbClr r="0" g="0" b="0"/>
+      </a:effectRef>
+      <a:fontRef idx="minor">
+        <a:schemeClr val="lt1"/>
+      </a:fontRef>
+    </dgm:style>
+  </dgm:styleLbl>
+  <dgm:styleLbl name="asst3">
+    <dgm:scene3d>
+      <a:camera prst="orthographicFront"/>
+      <a:lightRig rig="threePt" dir="t"/>
+    </dgm:scene3d>
+    <dgm:sp3d/>
+    <dgm:txPr/>
+    <dgm:style>
+      <a:lnRef idx="2">
+        <a:scrgbClr r="0" g="0" b="0"/>
+      </a:lnRef>
+      <a:fillRef idx="1">
+        <a:scrgbClr r="0" g="0" b="0"/>
+      </a:fillRef>
+      <a:effectRef idx="0">
+        <a:scrgbClr r="0" g="0" b="0"/>
+      </a:effectRef>
+      <a:fontRef idx="minor">
+        <a:schemeClr val="lt1"/>
+      </a:fontRef>
+    </dgm:style>
+  </dgm:styleLbl>
+  <dgm:styleLbl name="asst4">
+    <dgm:scene3d>
+      <a:camera prst="orthographicFront"/>
+      <a:lightRig rig="threePt" dir="t"/>
+    </dgm:scene3d>
+    <dgm:sp3d/>
+    <dgm:txPr/>
+    <dgm:style>
+      <a:lnRef idx="2">
+        <a:scrgbClr r="0" g="0" b="0"/>
+      </a:lnRef>
+      <a:fillRef idx="1">
+        <a:scrgbClr r="0" g="0" b="0"/>
+      </a:fillRef>
+      <a:effectRef idx="0">
+        <a:scrgbClr r="0" g="0" b="0"/>
+      </a:effectRef>
+      <a:fontRef idx="minor">
+        <a:schemeClr val="lt1"/>
+      </a:fontRef>
+    </dgm:style>
+  </dgm:styleLbl>
+  <dgm:styleLbl name="parChTrans2D1">
+    <dgm:scene3d>
+      <a:camera prst="orthographicFront"/>
+      <a:lightRig rig="threePt" dir="t"/>
+    </dgm:scene3d>
+    <dgm:sp3d/>
+    <dgm:txPr/>
+    <dgm:style>
+      <a:lnRef idx="2">
+        <a:scrgbClr r="0" g="0" b="0"/>
+      </a:lnRef>
+      <a:fillRef idx="1">
+        <a:scrgbClr r="0" g="0" b="0"/>
+      </a:fillRef>
+      <a:effectRef idx="0">
+        <a:scrgbClr r="0" g="0" b="0"/>
+      </a:effectRef>
+      <a:fontRef idx="minor">
+        <a:schemeClr val="lt1"/>
+      </a:fontRef>
+    </dgm:style>
+  </dgm:styleLbl>
+  <dgm:styleLbl name="parChTrans2D2">
+    <dgm:scene3d>
+      <a:camera prst="orthographicFront"/>
+      <a:lightRig rig="threePt" dir="t"/>
+    </dgm:scene3d>
+    <dgm:sp3d/>
+    <dgm:txPr/>
+    <dgm:style>
+      <a:lnRef idx="2">
+        <a:scrgbClr r="0" g="0" b="0"/>
+      </a:lnRef>
+      <a:fillRef idx="1">
+        <a:scrgbClr r="0" g="0" b="0"/>
+      </a:fillRef>
+      <a:effectRef idx="0">
+        <a:scrgbClr r="0" g="0" b="0"/>
+      </a:effectRef>
+      <a:fontRef idx="minor">
+        <a:schemeClr val="lt1"/>
+      </a:fontRef>
+    </dgm:style>
+  </dgm:styleLbl>
+  <dgm:styleLbl name="parChTrans2D3">
+    <dgm:scene3d>
+      <a:camera prst="orthographicFront"/>
+      <a:lightRig rig="threePt" dir="t"/>
+    </dgm:scene3d>
+    <dgm:sp3d/>
+    <dgm:txPr/>
+    <dgm:style>
+      <a:lnRef idx="2">
+        <a:scrgbClr r="0" g="0" b="0"/>
+      </a:lnRef>
+      <a:fillRef idx="1">
+        <a:scrgbClr r="0" g="0" b="0"/>
+      </a:fillRef>
+      <a:effectRef idx="0">
+        <a:scrgbClr r="0" g="0" b="0"/>
+      </a:effectRef>
+      <a:fontRef idx="minor">
+        <a:schemeClr val="lt1"/>
+      </a:fontRef>
+    </dgm:style>
+  </dgm:styleLbl>
+  <dgm:styleLbl name="parChTrans2D4">
+    <dgm:scene3d>
+      <a:camera prst="orthographicFront"/>
+      <a:lightRig rig="threePt" dir="t"/>
+    </dgm:scene3d>
+    <dgm:sp3d/>
+    <dgm:txPr/>
+    <dgm:style>
+      <a:lnRef idx="2">
+        <a:scrgbClr r="0" g="0" b="0"/>
+      </a:lnRef>
+      <a:fillRef idx="1">
+        <a:scrgbClr r="0" g="0" b="0"/>
+      </a:fillRef>
+      <a:effectRef idx="0">
+        <a:scrgbClr r="0" g="0" b="0"/>
+      </a:effectRef>
+      <a:fontRef idx="minor">
+        <a:schemeClr val="lt1"/>
+      </a:fontRef>
+    </dgm:style>
+  </dgm:styleLbl>
+  <dgm:styleLbl name="parChTrans1D1">
+    <dgm:scene3d>
+      <a:camera prst="orthographicFront"/>
+      <a:lightRig rig="threePt" dir="t"/>
+    </dgm:scene3d>
+    <dgm:sp3d/>
+    <dgm:txPr/>
+    <dgm:style>
+      <a:lnRef idx="2">
+        <a:scrgbClr r="0" g="0" b="0"/>
+      </a:lnRef>
+      <a:fillRef idx="0">
+        <a:scrgbClr r="0" g="0" b="0"/>
+      </a:fillRef>
+      <a:effectRef idx="0">
+        <a:scrgbClr r="0" g="0" b="0"/>
+      </a:effectRef>
+      <a:fontRef idx="minor"/>
+    </dgm:style>
+  </dgm:styleLbl>
+  <dgm:styleLbl name="parChTrans1D2">
+    <dgm:scene3d>
+      <a:camera prst="orthographicFront"/>
+      <a:lightRig rig="threePt" dir="t"/>
+    </dgm:scene3d>
+    <dgm:sp3d/>
+    <dgm:txPr/>
+    <dgm:style>
+      <a:lnRef idx="2">
+        <a:scrgbClr r="0" g="0" b="0"/>
+      </a:lnRef>
+      <a:fillRef idx="0">
+        <a:scrgbClr r="0" g="0" b="0"/>
+      </a:fillRef>
+      <a:effectRef idx="0">
+        <a:scrgbClr r="0" g="0" b="0"/>
+      </a:effectRef>
+      <a:fontRef idx="minor"/>
+    </dgm:style>
+  </dgm:styleLbl>
+  <dgm:styleLbl name="parChTrans1D3">
+    <dgm:scene3d>
+      <a:camera prst="orthographicFront"/>
+      <a:lightRig rig="threePt" dir="t"/>
+    </dgm:scene3d>
+    <dgm:sp3d/>
+    <dgm:txPr/>
+    <dgm:style>
+      <a:lnRef idx="2">
+        <a:scrgbClr r="0" g="0" b="0"/>
+      </a:lnRef>
+      <a:fillRef idx="0">
+        <a:scrgbClr r="0" g="0" b="0"/>
+      </a:fillRef>
+      <a:effectRef idx="0">
+        <a:scrgbClr r="0" g="0" b="0"/>
+      </a:effectRef>
+      <a:fontRef idx="minor"/>
+    </dgm:style>
+  </dgm:styleLbl>
+  <dgm:styleLbl name="parChTrans1D4">
+    <dgm:scene3d>
+      <a:camera prst="orthographicFront"/>
+      <a:lightRig rig="threePt" dir="t"/>
+    </dgm:scene3d>
+    <dgm:sp3d/>
+    <dgm:txPr/>
+    <dgm:style>
+      <a:lnRef idx="2">
+        <a:scrgbClr r="0" g="0" b="0"/>
+      </a:lnRef>
+      <a:fillRef idx="0">
+        <a:scrgbClr r="0" g="0" b="0"/>
+      </a:fillRef>
+      <a:effectRef idx="0">
+        <a:scrgbClr r="0" g="0" b="0"/>
+      </a:effectRef>
+      <a:fontRef idx="minor"/>
+    </dgm:style>
+  </dgm:styleLbl>
+  <dgm:styleLbl name="fgAcc1">
+    <dgm:scene3d>
+      <a:camera prst="orthographicFront"/>
+      <a:lightRig rig="threePt" dir="t"/>
+    </dgm:scene3d>
+    <dgm:sp3d/>
+    <dgm:txPr/>
+    <dgm:style>
+      <a:lnRef idx="2">
+        <a:scrgbClr r="0" g="0" b="0"/>
+      </a:lnRef>
+      <a:fillRef idx="1">
+        <a:scrgbClr r="0" g="0" b="0"/>
+      </a:fillRef>
+      <a:effectRef idx="0">
+        <a:scrgbClr r="0" g="0" b="0"/>
+      </a:effectRef>
+      <a:fontRef idx="minor"/>
+    </dgm:style>
+  </dgm:styleLbl>
+  <dgm:styleLbl name="conFgAcc1">
+    <dgm:scene3d>
+      <a:camera prst="orthographicFront"/>
+      <a:lightRig rig="threePt" dir="t"/>
+    </dgm:scene3d>
+    <dgm:sp3d/>
+    <dgm:txPr/>
+    <dgm:style>
+      <a:lnRef idx="2">
+        <a:scrgbClr r="0" g="0" b="0"/>
+      </a:lnRef>
+      <a:fillRef idx="1">
+        <a:scrgbClr r="0" g="0" b="0"/>
+      </a:fillRef>
+      <a:effectRef idx="0">
+        <a:scrgbClr r="0" g="0" b="0"/>
+      </a:effectRef>
+      <a:fontRef idx="minor"/>
+    </dgm:style>
+  </dgm:styleLbl>
+  <dgm:styleLbl name="alignAcc1">
+    <dgm:scene3d>
+      <a:camera prst="orthographicFront"/>
+      <a:lightRig rig="threePt" dir="t"/>
+    </dgm:scene3d>
+    <dgm:sp3d/>
+    <dgm:txPr/>
+    <dgm:style>
+      <a:lnRef idx="2">
+        <a:scrgbClr r="0" g="0" b="0"/>
+      </a:lnRef>
+      <a:fillRef idx="1">
+        <a:scrgbClr r="0" g="0" b="0"/>
+      </a:fillRef>
+      <a:effectRef idx="0">
+        <a:scrgbClr r="0" g="0" b="0"/>
+      </a:effectRef>
+      <a:fontRef idx="minor"/>
+    </dgm:style>
+  </dgm:styleLbl>
+  <dgm:styleLbl name="trAlignAcc1">
+    <dgm:scene3d>
+      <a:camera prst="orthographicFront"/>
+      <a:lightRig rig="threePt" dir="t"/>
+    </dgm:scene3d>
+    <dgm:sp3d/>
+    <dgm:txPr/>
+    <dgm:style>
+      <a:lnRef idx="1">
+        <a:scrgbClr r="0" g="0" b="0"/>
+      </a:lnRef>
+      <a:fillRef idx="1">
+        <a:scrgbClr r="0" g="0" b="0"/>
+      </a:fillRef>
+      <a:effectRef idx="0">
+        <a:scrgbClr r="0" g="0" b="0"/>
+      </a:effectRef>
+      <a:fontRef idx="minor"/>
+    </dgm:style>
+  </dgm:styleLbl>
+  <dgm:styleLbl name="bgAcc1">
+    <dgm:scene3d>
+      <a:camera prst="orthographicFront"/>
+      <a:lightRig rig="threePt" dir="t"/>
+    </dgm:scene3d>
+    <dgm:sp3d/>
+    <dgm:txPr/>
+    <dgm:style>
+      <a:lnRef idx="2">
+        <a:scrgbClr r="0" g="0" b="0"/>
+      </a:lnRef>
+      <a:fillRef idx="1">
+        <a:scrgbClr r="0" g="0" b="0"/>
+      </a:fillRef>
+      <a:effectRef idx="0">
+        <a:scrgbClr r="0" g="0" b="0"/>
+      </a:effectRef>
+      <a:fontRef idx="minor"/>
+    </dgm:style>
+  </dgm:styleLbl>
+  <dgm:styleLbl name="solidFgAcc1">
+    <dgm:scene3d>
+      <a:camera prst="orthographicFront"/>
+      <a:lightRig rig="threePt" dir="t"/>
+    </dgm:scene3d>
+    <dgm:sp3d/>
+    <dgm:txPr/>
+    <dgm:style>
+      <a:lnRef idx="2">
+        <a:scrgbClr r="0" g="0" b="0"/>
+      </a:lnRef>
+      <a:fillRef idx="1">
+        <a:scrgbClr r="0" g="0" b="0"/>
+      </a:fillRef>
+      <a:effectRef idx="0">
+        <a:scrgbClr r="0" g="0" b="0"/>
+      </a:effectRef>
+      <a:fontRef idx="minor"/>
+    </dgm:style>
+  </dgm:styleLbl>
+  <dgm:styleLbl name="solidAlignAcc1">
+    <dgm:scene3d>
+      <a:camera prst="orthographicFront"/>
+      <a:lightRig rig="threePt" dir="t"/>
+    </dgm:scene3d>
+    <dgm:sp3d/>
+    <dgm:txPr/>
+    <dgm:style>
+      <a:lnRef idx="2">
+        <a:scrgbClr r="0" g="0" b="0"/>
+      </a:lnRef>
+      <a:fillRef idx="1">
+        <a:scrgbClr r="0" g="0" b="0"/>
+      </a:fillRef>
+      <a:effectRef idx="0">
+        <a:scrgbClr r="0" g="0" b="0"/>
+      </a:effectRef>
+      <a:fontRef idx="minor"/>
+    </dgm:style>
+  </dgm:styleLbl>
+  <dgm:styleLbl name="solidBgAcc1">
+    <dgm:scene3d>
+      <a:camera prst="orthographicFront"/>
+      <a:lightRig rig="threePt" dir="t"/>
+    </dgm:scene3d>
+    <dgm:sp3d/>
+    <dgm:txPr/>
+    <dgm:style>
+      <a:lnRef idx="2">
+        <a:scrgbClr r="0" g="0" b="0"/>
+      </a:lnRef>
+      <a:fillRef idx="1">
+        <a:scrgbClr r="0" g="0" b="0"/>
+      </a:fillRef>
+      <a:effectRef idx="0">
+        <a:scrgbClr r="0" g="0" b="0"/>
+      </a:effectRef>
+      <a:fontRef idx="minor"/>
+    </dgm:style>
+  </dgm:styleLbl>
+  <dgm:styleLbl name="fgAccFollowNode1">
+    <dgm:scene3d>
+      <a:camera prst="orthographicFront"/>
+      <a:lightRig rig="threePt" dir="t"/>
+    </dgm:scene3d>
+    <dgm:sp3d/>
+    <dgm:txPr/>
+    <dgm:style>
+      <a:lnRef idx="2">
+        <a:scrgbClr r="0" g="0" b="0"/>
+      </a:lnRef>
+      <a:fillRef idx="1">
+        <a:scrgbClr r="0" g="0" b="0"/>
+      </a:fillRef>
+      <a:effectRef idx="0">
+        <a:scrgbClr r="0" g="0" b="0"/>
+      </a:effectRef>
+      <a:fontRef idx="minor"/>
+    </dgm:style>
+  </dgm:styleLbl>
+  <dgm:styleLbl name="alignAccFollowNode1">
+    <dgm:scene3d>
+      <a:camera prst="orthographicFront"/>
+      <a:lightRig rig="threePt" dir="t"/>
+    </dgm:scene3d>
+    <dgm:sp3d/>
+    <dgm:txPr/>
+    <dgm:style>
+      <a:lnRef idx="2">
+        <a:scrgbClr r="0" g="0" b="0"/>
+      </a:lnRef>
+      <a:fillRef idx="1">
+        <a:scrgbClr r="0" g="0" b="0"/>
+      </a:fillRef>
+      <a:effectRef idx="0">
+        <a:scrgbClr r="0" g="0" b="0"/>
+      </a:effectRef>
+      <a:fontRef idx="minor"/>
+    </dgm:style>
+  </dgm:styleLbl>
+  <dgm:styleLbl name="bgAccFollowNode1">
+    <dgm:scene3d>
+      <a:camera prst="orthographicFront"/>
+      <a:lightRig rig="threePt" dir="t"/>
+    </dgm:scene3d>
+    <dgm:sp3d/>
+    <dgm:txPr/>
+    <dgm:style>
+      <a:lnRef idx="2">
+        <a:scrgbClr r="0" g="0" b="0"/>
+      </a:lnRef>
+      <a:fillRef idx="1">
+        <a:scrgbClr r="0" g="0" b="0"/>
+      </a:fillRef>
+      <a:effectRef idx="0">
+        <a:scrgbClr r="0" g="0" b="0"/>
+      </a:effectRef>
+      <a:fontRef idx="minor"/>
+    </dgm:style>
+  </dgm:styleLbl>
+  <dgm:styleLbl name="fgAcc0">
+    <dgm:scene3d>
+      <a:camera prst="orthographicFront"/>
+      <a:lightRig rig="threePt" dir="t"/>
+    </dgm:scene3d>
+    <dgm:sp3d/>
+    <dgm:txPr/>
+    <dgm:style>
+      <a:lnRef idx="2">
+        <a:scrgbClr r="0" g="0" b="0"/>
+      </a:lnRef>
+      <a:fillRef idx="1">
+        <a:scrgbClr r="0" g="0" b="0"/>
+      </a:fillRef>
+      <a:effectRef idx="0">
+        <a:scrgbClr r="0" g="0" b="0"/>
+      </a:effectRef>
+      <a:fontRef idx="minor"/>
+    </dgm:style>
+  </dgm:styleLbl>
+  <dgm:styleLbl name="fgAcc2">
+    <dgm:scene3d>
+      <a:camera prst="orthographicFront"/>
+      <a:lightRig rig="threePt" dir="t"/>
+    </dgm:scene3d>
+    <dgm:sp3d/>
+    <dgm:txPr/>
+    <dgm:style>
+      <a:lnRef idx="2">
+        <a:scrgbClr r="0" g="0" b="0"/>
+      </a:lnRef>
+      <a:fillRef idx="1">
+        <a:scrgbClr r="0" g="0" b="0"/>
+      </a:fillRef>
+      <a:effectRef idx="0">
+        <a:scrgbClr r="0" g="0" b="0"/>
+      </a:effectRef>
+      <a:fontRef idx="minor"/>
+    </dgm:style>
+  </dgm:styleLbl>
+  <dgm:styleLbl name="fgAcc3">
+    <dgm:scene3d>
+      <a:camera prst="orthographicFront"/>
+      <a:lightRig rig="threePt" dir="t"/>
+    </dgm:scene3d>
+    <dgm:sp3d/>
+    <dgm:txPr/>
+    <dgm:style>
+      <a:lnRef idx="2">
+        <a:scrgbClr r="0" g="0" b="0"/>
+      </a:lnRef>
+      <a:fillRef idx="1">
+        <a:scrgbClr r="0" g="0" b="0"/>
+      </a:fillRef>
+      <a:effectRef idx="0">
+        <a:scrgbClr r="0" g="0" b="0"/>
+      </a:effectRef>
+      <a:fontRef idx="minor"/>
+    </dgm:style>
+  </dgm:styleLbl>
+  <dgm:styleLbl name="fgAcc4">
+    <dgm:scene3d>
+      <a:camera prst="orthographicFront"/>
+      <a:lightRig rig="threePt" dir="t"/>
+    </dgm:scene3d>
+    <dgm:sp3d/>
+    <dgm:txPr/>
+    <dgm:style>
+      <a:lnRef idx="2">
+        <a:scrgbClr r="0" g="0" b="0"/>
+      </a:lnRef>
+      <a:fillRef idx="1">
+        <a:scrgbClr r="0" g="0" b="0"/>
+      </a:fillRef>
+      <a:effectRef idx="0">
+        <a:scrgbClr r="0" g="0" b="0"/>
+      </a:effectRef>
+      <a:fontRef idx="minor"/>
+    </dgm:style>
+  </dgm:styleLbl>
+  <dgm:styleLbl name="bgShp">
+    <dgm:scene3d>
+      <a:camera prst="orthographicFront"/>
+      <a:lightRig rig="threePt" dir="t"/>
+    </dgm:scene3d>
+    <dgm:sp3d/>
+    <dgm:txPr/>
+    <dgm:style>
+      <a:lnRef idx="0">
+        <a:scrgbClr r="0" g="0" b="0"/>
+      </a:lnRef>
+      <a:fillRef idx="1">
+        <a:scrgbClr r="0" g="0" b="0"/>
+      </a:fillRef>
+      <a:effectRef idx="0">
+        <a:scrgbClr r="0" g="0" b="0"/>
+      </a:effectRef>
+      <a:fontRef idx="minor"/>
+    </dgm:style>
+  </dgm:styleLbl>
+  <dgm:styleLbl name="dkBgShp">
+    <dgm:scene3d>
+      <a:camera prst="orthographicFront"/>
+      <a:lightRig rig="threePt" dir="t"/>
+    </dgm:scene3d>
+    <dgm:sp3d/>
+    <dgm:txPr/>
+    <dgm:style>
+      <a:lnRef idx="0">
+        <a:scrgbClr r="0" g="0" b="0"/>
+      </a:lnRef>
+      <a:fillRef idx="1">
+        <a:scrgbClr r="0" g="0" b="0"/>
+      </a:fillRef>
+      <a:effectRef idx="0">
+        <a:scrgbClr r="0" g="0" b="0"/>
+      </a:effectRef>
+      <a:fontRef idx="minor"/>
+    </dgm:style>
+  </dgm:styleLbl>
+  <dgm:styleLbl name="trBgShp">
+    <dgm:scene3d>
+      <a:camera prst="orthographicFront"/>
+      <a:lightRig rig="threePt" dir="t"/>
+    </dgm:scene3d>
+    <dgm:sp3d/>
+    <dgm:txPr/>
+    <dgm:style>
+      <a:lnRef idx="0">
+        <a:scrgbClr r="0" g="0" b="0"/>
+      </a:lnRef>
+      <a:fillRef idx="1">
+        <a:scrgbClr r="0" g="0" b="0"/>
+      </a:fillRef>
+      <a:effectRef idx="0">
+        <a:scrgbClr r="0" g="0" b="0"/>
+      </a:effectRef>
+      <a:fontRef idx="minor"/>
+    </dgm:style>
+  </dgm:styleLbl>
+  <dgm:styleLbl name="fgShp">
+    <dgm:scene3d>
+      <a:camera prst="orthographicFront"/>
+      <a:lightRig rig="threePt" dir="t"/>
+    </dgm:scene3d>
+    <dgm:sp3d/>
+    <dgm:txPr/>
+    <dgm:style>
+      <a:lnRef idx="2">
+        <a:scrgbClr r="0" g="0" b="0"/>
+      </a:lnRef>
+      <a:fillRef idx="1">
+        <a:scrgbClr r="0" g="0" b="0"/>
+      </a:fillRef>
+      <a:effectRef idx="0">
+        <a:scrgbClr r="0" g="0" b="0"/>
+      </a:effectRef>
+      <a:fontRef idx="minor"/>
+    </dgm:style>
+  </dgm:styleLbl>
+  <dgm:styleLbl name="revTx">
+    <dgm:scene3d>
+      <a:camera prst="orthographicFront"/>
+      <a:lightRig rig="threePt" dir="t"/>
+    </dgm:scene3d>
+    <dgm:sp3d/>
+    <dgm:txPr/>
+    <dgm:style>
+      <a:lnRef idx="0">
+        <a:scrgbClr r="0" g="0" b="0"/>
+      </a:lnRef>
+      <a:fillRef idx="0">
+        <a:scrgbClr r="0" g="0" b="0"/>
+      </a:fillRef>
+      <a:effectRef idx="0">
+        <a:scrgbClr r="0" g="0" b="0"/>
+      </a:effectRef>
+      <a:fontRef idx="minor"/>
+    </dgm:style>
+  </dgm:styleLbl>
+</dgm:styleDef>
+</file>
+
+<file path=ppt/diagrams/quickStyle2.xml><?xml version="1.0" encoding="utf-8"?>
 <dgm:styleDef xmlns:dgm="http://schemas.openxmlformats.org/drawingml/2006/diagram" xmlns:a="http://schemas.openxmlformats.org/drawingml/2006/main" uniqueId="urn:microsoft.com/office/officeart/2005/8/quickstyle/simple1">
   <dgm:title val=""/>
   <dgm:desc val=""/>
@@ -7640,6 +10549,61 @@
 </p:sld>
 </file>
 
+<file path=ppt/slides/slide3.xml><?xml version="1.0" encoding="utf-8"?>
+<p:sld xmlns:a="http://schemas.openxmlformats.org/drawingml/2006/main" xmlns:r="http://schemas.openxmlformats.org/officeDocument/2006/relationships" xmlns:p="http://schemas.openxmlformats.org/presentationml/2006/main">
+  <p:cSld>
+    <p:spTree>
+      <p:nvGrpSpPr>
+        <p:cNvPr id="1" name=""/>
+        <p:cNvGrpSpPr/>
+        <p:nvPr/>
+      </p:nvGrpSpPr>
+      <p:grpSpPr>
+        <a:xfrm>
+          <a:off x="0" y="0"/>
+          <a:ext cx="0" cy="0"/>
+          <a:chOff x="0" y="0"/>
+          <a:chExt cx="0" cy="0"/>
+        </a:xfrm>
+      </p:grpSpPr>
+      <p:graphicFrame>
+        <p:nvGraphicFramePr>
+          <p:cNvPr id="4" name="Content Placeholder 3"/>
+          <p:cNvGraphicFramePr>
+            <a:graphicFrameLocks noGrp="1"/>
+          </p:cNvGraphicFramePr>
+          <p:nvPr>
+            <p:ph idx="1"/>
+            <p:extLst>
+              <p:ext uri="{D42A27DB-BD31-4B8C-83A1-F6EECF244321}">
+                <p14:modId xmlns:p14="http://schemas.microsoft.com/office/powerpoint/2010/main" val="2988739445"/>
+              </p:ext>
+            </p:extLst>
+          </p:nvPr>
+        </p:nvGraphicFramePr>
+        <p:xfrm>
+          <a:off x="838200" y="1825625"/>
+          <a:ext cx="10515600" cy="4351338"/>
+        </p:xfrm>
+        <a:graphic>
+          <a:graphicData uri="http://schemas.openxmlformats.org/drawingml/2006/diagram">
+            <dgm:relIds xmlns:dgm="http://schemas.openxmlformats.org/drawingml/2006/diagram" xmlns:r="http://schemas.openxmlformats.org/officeDocument/2006/relationships" r:dm="rId2" r:lo="rId3" r:qs="rId4" r:cs="rId5"/>
+          </a:graphicData>
+        </a:graphic>
+      </p:graphicFrame>
+    </p:spTree>
+    <p:extLst>
+      <p:ext uri="{BB962C8B-B14F-4D97-AF65-F5344CB8AC3E}">
+        <p14:creationId xmlns:p14="http://schemas.microsoft.com/office/powerpoint/2010/main" val="1266404647"/>
+      </p:ext>
+    </p:extLst>
+  </p:cSld>
+  <p:clrMapOvr>
+    <a:masterClrMapping/>
+  </p:clrMapOvr>
+</p:sld>
+</file>
+
 <file path=ppt/theme/theme1.xml><?xml version="1.0" encoding="utf-8"?>
 <a:theme xmlns:a="http://schemas.openxmlformats.org/drawingml/2006/main" name="Office Theme">
   <a:themeElements>

</xml_diff>

<commit_message>
finished methods first draft
</commit_message>
<xml_diff>
--- a/ppt.pptx
+++ b/ppt.pptx
@@ -1774,8 +1774,8 @@
         <a:lstStyle/>
         <a:p>
           <a:r>
-            <a:rPr lang="en-US" dirty="0" smtClean="0"/>
-            <a:t>Bigrams: headlines and full text</a:t>
+            <a:rPr lang="en-US" smtClean="0"/>
+            <a:t>Bigrams</a:t>
           </a:r>
           <a:endParaRPr lang="en-US" dirty="0"/>
         </a:p>
@@ -2671,6 +2671,13 @@
         </dgm:presLayoutVars>
       </dgm:prSet>
       <dgm:spPr/>
+      <dgm:t>
+        <a:bodyPr/>
+        <a:lstStyle/>
+        <a:p>
+          <a:endParaRPr lang="en-US"/>
+        </a:p>
+      </dgm:t>
     </dgm:pt>
     <dgm:pt modelId="{40F8DB0F-8A4F-48F6-B8FF-02EA328EA6E7}" type="pres">
       <dgm:prSet presAssocID="{50566C3F-72D8-4B9D-B172-562EE4AEA551}" presName="arrow" presStyleLbl="bgShp" presStyleIdx="0" presStyleCnt="1"/>
@@ -2687,6 +2694,13 @@
         </dgm:presLayoutVars>
       </dgm:prSet>
       <dgm:spPr/>
+      <dgm:t>
+        <a:bodyPr/>
+        <a:lstStyle/>
+        <a:p>
+          <a:endParaRPr lang="en-US"/>
+        </a:p>
+      </dgm:t>
     </dgm:pt>
     <dgm:pt modelId="{3EEA07EC-B9B3-412B-ADA6-144DBDFA38A6}" type="pres">
       <dgm:prSet presAssocID="{805B52CF-8124-4903-96AC-CDD12D94ECAE}" presName="sibTrans" presStyleCnt="0"/>
@@ -2728,25 +2742,25 @@
     </dgm:pt>
   </dgm:ptLst>
   <dgm:cxnLst>
+    <dgm:cxn modelId="{55138F1E-01D3-4CD6-A280-603342D50863}" type="presOf" srcId="{07127421-B1DB-4614-9309-B07B3DE38419}" destId="{A8767C69-185C-4B96-9F00-E550000B9C96}" srcOrd="0" destOrd="1" presId="urn:microsoft.com/office/officeart/2005/8/layout/hProcess9"/>
+    <dgm:cxn modelId="{DA85E77F-25C0-4B59-B057-B0D1C2FBECB9}" type="presOf" srcId="{50566C3F-72D8-4B9D-B172-562EE4AEA551}" destId="{5B5A6F85-06A4-4980-AA69-6E2BABE04015}" srcOrd="0" destOrd="0" presId="urn:microsoft.com/office/officeart/2005/8/layout/hProcess9"/>
+    <dgm:cxn modelId="{642ED434-1379-405B-8656-F68376D5B72E}" srcId="{50566C3F-72D8-4B9D-B172-562EE4AEA551}" destId="{4677E005-F769-4A9D-91D0-4A0342C20D4E}" srcOrd="0" destOrd="0" parTransId="{661547F2-BACD-4034-8B7B-94D7D0F7C8B7}" sibTransId="{805B52CF-8124-4903-96AC-CDD12D94ECAE}"/>
+    <dgm:cxn modelId="{86D2A0D5-A28D-48C1-BDE3-2233ECFAD03C}" type="presOf" srcId="{4677E005-F769-4A9D-91D0-4A0342C20D4E}" destId="{7E5B0976-430A-4222-BF6E-212E29A31958}" srcOrd="0" destOrd="0" presId="urn:microsoft.com/office/officeart/2005/8/layout/hProcess9"/>
+    <dgm:cxn modelId="{4A54AE33-0C66-49FC-99EB-FFDAC977245E}" srcId="{50566C3F-72D8-4B9D-B172-562EE4AEA551}" destId="{649843C5-9CA6-446A-9731-6DBB3333D83D}" srcOrd="2" destOrd="0" parTransId="{99AFE336-CE31-4DE5-9007-CE4436580697}" sibTransId="{85BA92F0-E471-482B-A0F0-634B9BD71D69}"/>
+    <dgm:cxn modelId="{F8CDDE9A-9261-4868-A9EA-BE26FD81A6B8}" type="presOf" srcId="{5EE58050-B517-41D0-AEA9-591C272A1314}" destId="{A8767C69-185C-4B96-9F00-E550000B9C96}" srcOrd="0" destOrd="2" presId="urn:microsoft.com/office/officeart/2005/8/layout/hProcess9"/>
+    <dgm:cxn modelId="{019A93FE-5102-4A2B-B8D2-CD97953C1E27}" type="presOf" srcId="{C9FC2216-03D6-4316-B115-CE4547F5AF62}" destId="{4FEA9211-38AC-414A-BC60-3561B720BFC4}" srcOrd="0" destOrd="2" presId="urn:microsoft.com/office/officeart/2005/8/layout/hProcess9"/>
+    <dgm:cxn modelId="{A3725179-D09A-4893-A2D2-36CDC20F9792}" srcId="{68E6159D-47D3-4DA7-850F-16C5A8B2557B}" destId="{C5EDC3FF-EA6E-471D-815B-CFA750C4F706}" srcOrd="0" destOrd="0" parTransId="{16B9CBD4-0F9A-4236-B0D3-5A0ECB85FB3B}" sibTransId="{344A6458-A44A-44EA-8474-4E8C98BF094E}"/>
+    <dgm:cxn modelId="{87A3A9E0-B465-4BF9-9F27-9F73232DD4FE}" type="presOf" srcId="{E0A1DD6A-FEB4-4EC2-AC2D-D67D26074C6E}" destId="{7E5B0976-430A-4222-BF6E-212E29A31958}" srcOrd="0" destOrd="2" presId="urn:microsoft.com/office/officeart/2005/8/layout/hProcess9"/>
+    <dgm:cxn modelId="{A92F6104-0861-40F9-A77F-A14F60919CE1}" srcId="{4677E005-F769-4A9D-91D0-4A0342C20D4E}" destId="{E0A1DD6A-FEB4-4EC2-AC2D-D67D26074C6E}" srcOrd="1" destOrd="0" parTransId="{078C20F8-997F-449F-AEE8-E7DB9471B662}" sibTransId="{C1B4AC7E-7354-437E-8B60-8EB8E31CF99E}"/>
+    <dgm:cxn modelId="{655DB861-49DE-45FF-A33F-D1137C4FBC81}" srcId="{649843C5-9CA6-446A-9731-6DBB3333D83D}" destId="{5EE58050-B517-41D0-AEA9-591C272A1314}" srcOrd="1" destOrd="0" parTransId="{ED641DF8-5419-45E2-A9B0-D1BD363B1E0F}" sibTransId="{0C6F117D-963A-4A3D-858A-1AE457E575F2}"/>
+    <dgm:cxn modelId="{D4BBF14E-27AE-4FF6-B245-19D5601F8936}" srcId="{649843C5-9CA6-446A-9731-6DBB3333D83D}" destId="{07127421-B1DB-4614-9309-B07B3DE38419}" srcOrd="0" destOrd="0" parTransId="{02276A56-DDD4-40F2-9278-131ADA994981}" sibTransId="{DEB7D60C-25CB-4E9E-B3CA-3212478EEE2C}"/>
+    <dgm:cxn modelId="{EF82A94F-C753-4A75-9FEB-9785A4BBAEC6}" srcId="{4677E005-F769-4A9D-91D0-4A0342C20D4E}" destId="{67586C50-7147-4EBB-8399-1183C1E5EE38}" srcOrd="0" destOrd="0" parTransId="{2FA489F3-BEC8-4CF9-A658-2325CD28E622}" sibTransId="{C9AAE18C-356E-4C9D-A89F-81E06A010621}"/>
     <dgm:cxn modelId="{DA902746-AF7F-4137-88B4-402A8B3C47C2}" type="presOf" srcId="{68E6159D-47D3-4DA7-850F-16C5A8B2557B}" destId="{4FEA9211-38AC-414A-BC60-3561B720BFC4}" srcOrd="0" destOrd="0" presId="urn:microsoft.com/office/officeart/2005/8/layout/hProcess9"/>
+    <dgm:cxn modelId="{A98752BC-1347-4BAA-AB0E-1BACE661B5E0}" srcId="{50566C3F-72D8-4B9D-B172-562EE4AEA551}" destId="{68E6159D-47D3-4DA7-850F-16C5A8B2557B}" srcOrd="1" destOrd="0" parTransId="{69B705C9-B319-4298-9A66-C519206EB941}" sibTransId="{27D2B6A9-FFEB-4530-A7D6-932E5120090B}"/>
+    <dgm:cxn modelId="{2E22BF80-8ED0-4761-8FA1-330D78DB88AB}" srcId="{68E6159D-47D3-4DA7-850F-16C5A8B2557B}" destId="{C9FC2216-03D6-4316-B115-CE4547F5AF62}" srcOrd="1" destOrd="0" parTransId="{A8357C69-6FE9-45BD-A53B-F02A3AE25AD7}" sibTransId="{992B276D-8F7E-4349-911E-A3D5AF6CBF8C}"/>
     <dgm:cxn modelId="{4970FBC5-F441-4C6D-A262-9654943E5036}" type="presOf" srcId="{67586C50-7147-4EBB-8399-1183C1E5EE38}" destId="{7E5B0976-430A-4222-BF6E-212E29A31958}" srcOrd="0" destOrd="1" presId="urn:microsoft.com/office/officeart/2005/8/layout/hProcess9"/>
-    <dgm:cxn modelId="{86D2A0D5-A28D-48C1-BDE3-2233ECFAD03C}" type="presOf" srcId="{4677E005-F769-4A9D-91D0-4A0342C20D4E}" destId="{7E5B0976-430A-4222-BF6E-212E29A31958}" srcOrd="0" destOrd="0" presId="urn:microsoft.com/office/officeart/2005/8/layout/hProcess9"/>
-    <dgm:cxn modelId="{A3725179-D09A-4893-A2D2-36CDC20F9792}" srcId="{68E6159D-47D3-4DA7-850F-16C5A8B2557B}" destId="{C5EDC3FF-EA6E-471D-815B-CFA750C4F706}" srcOrd="0" destOrd="0" parTransId="{16B9CBD4-0F9A-4236-B0D3-5A0ECB85FB3B}" sibTransId="{344A6458-A44A-44EA-8474-4E8C98BF094E}"/>
-    <dgm:cxn modelId="{55138F1E-01D3-4CD6-A280-603342D50863}" type="presOf" srcId="{07127421-B1DB-4614-9309-B07B3DE38419}" destId="{A8767C69-185C-4B96-9F00-E550000B9C96}" srcOrd="0" destOrd="1" presId="urn:microsoft.com/office/officeart/2005/8/layout/hProcess9"/>
-    <dgm:cxn modelId="{4A54AE33-0C66-49FC-99EB-FFDAC977245E}" srcId="{50566C3F-72D8-4B9D-B172-562EE4AEA551}" destId="{649843C5-9CA6-446A-9731-6DBB3333D83D}" srcOrd="2" destOrd="0" parTransId="{99AFE336-CE31-4DE5-9007-CE4436580697}" sibTransId="{85BA92F0-E471-482B-A0F0-634B9BD71D69}"/>
-    <dgm:cxn modelId="{87A3A9E0-B465-4BF9-9F27-9F73232DD4FE}" type="presOf" srcId="{E0A1DD6A-FEB4-4EC2-AC2D-D67D26074C6E}" destId="{7E5B0976-430A-4222-BF6E-212E29A31958}" srcOrd="0" destOrd="2" presId="urn:microsoft.com/office/officeart/2005/8/layout/hProcess9"/>
     <dgm:cxn modelId="{8740DB06-6AAB-43A3-A89B-C3718342AAC7}" type="presOf" srcId="{649843C5-9CA6-446A-9731-6DBB3333D83D}" destId="{A8767C69-185C-4B96-9F00-E550000B9C96}" srcOrd="0" destOrd="0" presId="urn:microsoft.com/office/officeart/2005/8/layout/hProcess9"/>
-    <dgm:cxn modelId="{655DB861-49DE-45FF-A33F-D1137C4FBC81}" srcId="{649843C5-9CA6-446A-9731-6DBB3333D83D}" destId="{5EE58050-B517-41D0-AEA9-591C272A1314}" srcOrd="1" destOrd="0" parTransId="{ED641DF8-5419-45E2-A9B0-D1BD363B1E0F}" sibTransId="{0C6F117D-963A-4A3D-858A-1AE457E575F2}"/>
-    <dgm:cxn modelId="{DA85E77F-25C0-4B59-B057-B0D1C2FBECB9}" type="presOf" srcId="{50566C3F-72D8-4B9D-B172-562EE4AEA551}" destId="{5B5A6F85-06A4-4980-AA69-6E2BABE04015}" srcOrd="0" destOrd="0" presId="urn:microsoft.com/office/officeart/2005/8/layout/hProcess9"/>
-    <dgm:cxn modelId="{A98752BC-1347-4BAA-AB0E-1BACE661B5E0}" srcId="{50566C3F-72D8-4B9D-B172-562EE4AEA551}" destId="{68E6159D-47D3-4DA7-850F-16C5A8B2557B}" srcOrd="1" destOrd="0" parTransId="{69B705C9-B319-4298-9A66-C519206EB941}" sibTransId="{27D2B6A9-FFEB-4530-A7D6-932E5120090B}"/>
-    <dgm:cxn modelId="{D4BBF14E-27AE-4FF6-B245-19D5601F8936}" srcId="{649843C5-9CA6-446A-9731-6DBB3333D83D}" destId="{07127421-B1DB-4614-9309-B07B3DE38419}" srcOrd="0" destOrd="0" parTransId="{02276A56-DDD4-40F2-9278-131ADA994981}" sibTransId="{DEB7D60C-25CB-4E9E-B3CA-3212478EEE2C}"/>
-    <dgm:cxn modelId="{2E22BF80-8ED0-4761-8FA1-330D78DB88AB}" srcId="{68E6159D-47D3-4DA7-850F-16C5A8B2557B}" destId="{C9FC2216-03D6-4316-B115-CE4547F5AF62}" srcOrd="1" destOrd="0" parTransId="{A8357C69-6FE9-45BD-A53B-F02A3AE25AD7}" sibTransId="{992B276D-8F7E-4349-911E-A3D5AF6CBF8C}"/>
-    <dgm:cxn modelId="{EF82A94F-C753-4A75-9FEB-9785A4BBAEC6}" srcId="{4677E005-F769-4A9D-91D0-4A0342C20D4E}" destId="{67586C50-7147-4EBB-8399-1183C1E5EE38}" srcOrd="0" destOrd="0" parTransId="{2FA489F3-BEC8-4CF9-A658-2325CD28E622}" sibTransId="{C9AAE18C-356E-4C9D-A89F-81E06A010621}"/>
-    <dgm:cxn modelId="{019A93FE-5102-4A2B-B8D2-CD97953C1E27}" type="presOf" srcId="{C9FC2216-03D6-4316-B115-CE4547F5AF62}" destId="{4FEA9211-38AC-414A-BC60-3561B720BFC4}" srcOrd="0" destOrd="2" presId="urn:microsoft.com/office/officeart/2005/8/layout/hProcess9"/>
-    <dgm:cxn modelId="{F8CDDE9A-9261-4868-A9EA-BE26FD81A6B8}" type="presOf" srcId="{5EE58050-B517-41D0-AEA9-591C272A1314}" destId="{A8767C69-185C-4B96-9F00-E550000B9C96}" srcOrd="0" destOrd="2" presId="urn:microsoft.com/office/officeart/2005/8/layout/hProcess9"/>
-    <dgm:cxn modelId="{A92F6104-0861-40F9-A77F-A14F60919CE1}" srcId="{4677E005-F769-4A9D-91D0-4A0342C20D4E}" destId="{E0A1DD6A-FEB4-4EC2-AC2D-D67D26074C6E}" srcOrd="1" destOrd="0" parTransId="{078C20F8-997F-449F-AEE8-E7DB9471B662}" sibTransId="{C1B4AC7E-7354-437E-8B60-8EB8E31CF99E}"/>
     <dgm:cxn modelId="{81D31EA0-1AB1-4529-B5DA-B4FE0AD1306D}" type="presOf" srcId="{C5EDC3FF-EA6E-471D-815B-CFA750C4F706}" destId="{4FEA9211-38AC-414A-BC60-3561B720BFC4}" srcOrd="0" destOrd="1" presId="urn:microsoft.com/office/officeart/2005/8/layout/hProcess9"/>
-    <dgm:cxn modelId="{642ED434-1379-405B-8656-F68376D5B72E}" srcId="{50566C3F-72D8-4B9D-B172-562EE4AEA551}" destId="{4677E005-F769-4A9D-91D0-4A0342C20D4E}" srcOrd="0" destOrd="0" parTransId="{661547F2-BACD-4034-8B7B-94D7D0F7C8B7}" sibTransId="{805B52CF-8124-4903-96AC-CDD12D94ECAE}"/>
     <dgm:cxn modelId="{5F064828-2353-4B82-AC16-ADE5D197750F}" type="presParOf" srcId="{5B5A6F85-06A4-4980-AA69-6E2BABE04015}" destId="{40F8DB0F-8A4F-48F6-B8FF-02EA328EA6E7}" srcOrd="0" destOrd="0" presId="urn:microsoft.com/office/officeart/2005/8/layout/hProcess9"/>
     <dgm:cxn modelId="{F8A0DC51-FDAE-4D32-8D71-AA0982B0A263}" type="presParOf" srcId="{5B5A6F85-06A4-4980-AA69-6E2BABE04015}" destId="{97CC1BF7-24DF-4DCA-9ECE-D4E8CEBB1507}" srcOrd="1" destOrd="0" presId="urn:microsoft.com/office/officeart/2005/8/layout/hProcess9"/>
     <dgm:cxn modelId="{0243F051-E7F4-4E3F-BE97-DF03219C372F}" type="presParOf" srcId="{97CC1BF7-24DF-4DCA-9ECE-D4E8CEBB1507}" destId="{7E5B0976-430A-4222-BF6E-212E29A31958}" srcOrd="0" destOrd="0" presId="urn:microsoft.com/office/officeart/2005/8/layout/hProcess9"/>
@@ -2780,8 +2794,8 @@
       </dsp:nvSpPr>
       <dsp:spPr>
         <a:xfrm rot="5400000">
-          <a:off x="266" y="785584"/>
-          <a:ext cx="3469835" cy="3470368"/>
+          <a:off x="272" y="1003394"/>
+          <a:ext cx="3551131" cy="3551677"/>
         </a:xfrm>
         <a:prstGeom prst="blockArc">
           <a:avLst>
@@ -2834,8 +2848,8 @@
       </dsp:nvSpPr>
       <dsp:spPr>
         <a:xfrm rot="16200000">
-          <a:off x="3571439" y="785584"/>
-          <a:ext cx="3469835" cy="3470368"/>
+          <a:off x="3655115" y="1003394"/>
+          <a:ext cx="3551131" cy="3551677"/>
         </a:xfrm>
         <a:prstGeom prst="blockArc">
           <a:avLst>
@@ -2888,8 +2902,8 @@
       </dsp:nvSpPr>
       <dsp:spPr>
         <a:xfrm>
-          <a:off x="3981736" y="3799939"/>
-          <a:ext cx="2634540" cy="694189"/>
+          <a:off x="4075026" y="4088373"/>
+          <a:ext cx="2696265" cy="710454"/>
         </a:xfrm>
         <a:prstGeom prst="rect">
           <a:avLst/>
@@ -2937,8 +2951,8 @@
         </a:p>
       </dsp:txBody>
       <dsp:txXfrm>
-        <a:off x="3981736" y="3799939"/>
-        <a:ext cx="2634540" cy="694189"/>
+        <a:off x="4075026" y="4088373"/>
+        <a:ext cx="2696265" cy="710454"/>
       </dsp:txXfrm>
     </dsp:sp>
     <dsp:sp modelId="{0518B534-DC62-4E17-85D9-AA657CEE396C}">
@@ -2948,8 +2962,8 @@
       </dsp:nvSpPr>
       <dsp:spPr>
         <a:xfrm rot="5400000">
-          <a:off x="3460135" y="785584"/>
-          <a:ext cx="3469835" cy="3470368"/>
+          <a:off x="3541204" y="1003394"/>
+          <a:ext cx="3551131" cy="3551677"/>
         </a:xfrm>
         <a:prstGeom prst="blockArc">
           <a:avLst>
@@ -3002,8 +3016,8 @@
       </dsp:nvSpPr>
       <dsp:spPr>
         <a:xfrm rot="16200000">
-          <a:off x="7030257" y="785584"/>
-          <a:ext cx="3469835" cy="3470368"/>
+          <a:off x="7194972" y="1003394"/>
+          <a:ext cx="3551131" cy="3551677"/>
         </a:xfrm>
         <a:prstGeom prst="blockArc">
           <a:avLst>
@@ -3056,8 +3070,8 @@
       </dsp:nvSpPr>
       <dsp:spPr>
         <a:xfrm>
-          <a:off x="7187496" y="3799939"/>
-          <a:ext cx="2634540" cy="694189"/>
+          <a:off x="7355895" y="4088373"/>
+          <a:ext cx="2696265" cy="710454"/>
         </a:xfrm>
         <a:prstGeom prst="rect">
           <a:avLst/>
@@ -3105,8 +3119,8 @@
         </a:p>
       </dsp:txBody>
       <dsp:txXfrm>
-        <a:off x="7187496" y="3799939"/>
-        <a:ext cx="2634540" cy="694189"/>
+        <a:off x="7355895" y="4088373"/>
+        <a:ext cx="2696265" cy="710454"/>
       </dsp:txXfrm>
     </dsp:sp>
     <dsp:sp modelId="{A04132B8-9CD6-47BF-B2BB-89920AAB372E}">
@@ -3116,8 +3130,8 @@
       </dsp:nvSpPr>
       <dsp:spPr>
         <a:xfrm>
-          <a:off x="4534312" y="1389220"/>
-          <a:ext cx="1461135" cy="1461135"/>
+          <a:off x="4640548" y="1621173"/>
+          <a:ext cx="1495369" cy="1495369"/>
         </a:xfrm>
         <a:prstGeom prst="ellipse">
           <a:avLst/>
@@ -3184,8 +3198,8 @@
         </a:p>
       </dsp:txBody>
       <dsp:txXfrm>
-        <a:off x="4729130" y="1644919"/>
-        <a:ext cx="1071499" cy="657511"/>
+        <a:off x="4839931" y="1882862"/>
+        <a:ext cx="1096604" cy="672916"/>
       </dsp:txXfrm>
     </dsp:sp>
     <dsp:sp modelId="{F2542C5A-AEF4-408D-9B27-1AAC407FAE75}">
@@ -3195,8 +3209,8 @@
       </dsp:nvSpPr>
       <dsp:spPr>
         <a:xfrm>
-          <a:off x="5061539" y="2302430"/>
-          <a:ext cx="1461135" cy="1461135"/>
+          <a:off x="5180127" y="2555778"/>
+          <a:ext cx="1495369" cy="1495369"/>
         </a:xfrm>
         <a:prstGeom prst="ellipse">
           <a:avLst/>
@@ -3263,8 +3277,8 @@
         </a:p>
       </dsp:txBody>
       <dsp:txXfrm>
-        <a:off x="5508403" y="2679890"/>
-        <a:ext cx="876681" cy="803624"/>
+        <a:off x="5637461" y="2942082"/>
+        <a:ext cx="897221" cy="822453"/>
       </dsp:txXfrm>
     </dsp:sp>
     <dsp:sp modelId="{985D2040-7084-45AB-805C-3961BB24AE11}">
@@ -3274,8 +3288,8 @@
       </dsp:nvSpPr>
       <dsp:spPr>
         <a:xfrm>
-          <a:off x="4007086" y="2302430"/>
-          <a:ext cx="1461135" cy="1461135"/>
+          <a:off x="4100969" y="2555778"/>
+          <a:ext cx="1495369" cy="1495369"/>
         </a:xfrm>
         <a:prstGeom prst="ellipse">
           <a:avLst/>
@@ -3342,8 +3356,8 @@
         </a:p>
       </dsp:txBody>
       <dsp:txXfrm>
-        <a:off x="4144676" y="2679890"/>
-        <a:ext cx="876681" cy="803624"/>
+        <a:off x="4241783" y="2942082"/>
+        <a:ext cx="897221" cy="822453"/>
       </dsp:txXfrm>
     </dsp:sp>
     <dsp:sp modelId="{BFBFC44E-8039-47C7-8EB4-2232798AF365}">
@@ -3353,8 +3367,8 @@
       </dsp:nvSpPr>
       <dsp:spPr>
         <a:xfrm>
-          <a:off x="1163282" y="1215640"/>
-          <a:ext cx="1162209" cy="1162069"/>
+          <a:off x="1190537" y="1443526"/>
+          <a:ext cx="1189439" cy="1189295"/>
         </a:xfrm>
         <a:prstGeom prst="ellipse">
           <a:avLst/>
@@ -3397,12 +3411,12 @@
         </a:fontRef>
       </dsp:style>
       <dsp:txBody>
-        <a:bodyPr spcFirstLastPara="0" vert="horz" wrap="square" lIns="45720" tIns="45720" rIns="45720" bIns="45720" numCol="1" spcCol="1270" anchor="ctr" anchorCtr="0">
+        <a:bodyPr spcFirstLastPara="0" vert="horz" wrap="square" lIns="49530" tIns="49530" rIns="49530" bIns="49530" numCol="1" spcCol="1270" anchor="ctr" anchorCtr="0">
           <a:noAutofit/>
         </a:bodyPr>
         <a:lstStyle/>
         <a:p>
-          <a:pPr lvl="0" algn="ctr" defTabSz="533400">
+          <a:pPr lvl="0" algn="ctr" defTabSz="577850">
             <a:lnSpc>
               <a:spcPct val="90000"/>
             </a:lnSpc>
@@ -3414,15 +3428,15 @@
             </a:spcAft>
           </a:pPr>
           <a:r>
-            <a:rPr lang="en-US" sz="1200" kern="1200" dirty="0" smtClean="0"/>
+            <a:rPr lang="en-US" sz="1300" kern="1200" dirty="0" smtClean="0"/>
             <a:t>Sentiment Analysis</a:t>
           </a:r>
-          <a:endParaRPr lang="en-US" sz="1200" kern="1200" dirty="0"/>
+          <a:endParaRPr lang="en-US" sz="1300" kern="1200" dirty="0"/>
         </a:p>
       </dsp:txBody>
       <dsp:txXfrm>
-        <a:off x="1333484" y="1385821"/>
-        <a:ext cx="821805" cy="821707"/>
+        <a:off x="1364726" y="1617694"/>
+        <a:ext cx="841061" cy="840959"/>
       </dsp:txXfrm>
     </dsp:sp>
     <dsp:sp modelId="{FE4AA2AE-1E25-43B1-9B19-CFE51BE51A15}">
@@ -3432,8 +3446,8 @@
       </dsp:nvSpPr>
       <dsp:spPr>
         <a:xfrm>
-          <a:off x="734725" y="2187168"/>
-          <a:ext cx="570643" cy="570592"/>
+          <a:off x="751939" y="2437816"/>
+          <a:ext cx="584013" cy="583960"/>
         </a:xfrm>
         <a:prstGeom prst="ellipse">
           <a:avLst/>
@@ -3483,8 +3497,8 @@
       </dsp:nvSpPr>
       <dsp:spPr>
         <a:xfrm>
-          <a:off x="2420676" y="1444341"/>
-          <a:ext cx="331994" cy="332093"/>
+          <a:off x="2477391" y="1677585"/>
+          <a:ext cx="339772" cy="339874"/>
         </a:xfrm>
         <a:prstGeom prst="ellipse">
           <a:avLst/>
@@ -3534,8 +3548,8 @@
       </dsp:nvSpPr>
       <dsp:spPr>
         <a:xfrm>
-          <a:off x="1871644" y="2228680"/>
-          <a:ext cx="1162209" cy="1162069"/>
+          <a:off x="1915495" y="2480301"/>
+          <a:ext cx="1189439" cy="1189295"/>
         </a:xfrm>
         <a:prstGeom prst="ellipse">
           <a:avLst/>
@@ -3578,12 +3592,12 @@
         </a:fontRef>
       </dsp:style>
       <dsp:txBody>
-        <a:bodyPr spcFirstLastPara="0" vert="horz" wrap="square" lIns="45720" tIns="45720" rIns="45720" bIns="45720" numCol="1" spcCol="1270" anchor="ctr" anchorCtr="0">
+        <a:bodyPr spcFirstLastPara="0" vert="horz" wrap="square" lIns="49530" tIns="49530" rIns="49530" bIns="49530" numCol="1" spcCol="1270" anchor="ctr" anchorCtr="0">
           <a:noAutofit/>
         </a:bodyPr>
         <a:lstStyle/>
         <a:p>
-          <a:pPr lvl="0" algn="ctr" defTabSz="533400">
+          <a:pPr lvl="0" algn="ctr" defTabSz="577850">
             <a:lnSpc>
               <a:spcPct val="90000"/>
             </a:lnSpc>
@@ -3595,15 +3609,15 @@
             </a:spcAft>
           </a:pPr>
           <a:r>
-            <a:rPr lang="en-US" sz="1200" kern="1200" dirty="0" smtClean="0"/>
-            <a:t>Bigrams: headlines and full text</a:t>
+            <a:rPr lang="en-US" sz="1300" kern="1200" smtClean="0"/>
+            <a:t>Bigrams</a:t>
           </a:r>
-          <a:endParaRPr lang="en-US" sz="1200" kern="1200" dirty="0"/>
+          <a:endParaRPr lang="en-US" sz="1300" kern="1200" dirty="0"/>
         </a:p>
       </dsp:txBody>
       <dsp:txXfrm>
-        <a:off x="2041846" y="2398861"/>
-        <a:ext cx="821805" cy="821707"/>
+        <a:off x="2089684" y="2654469"/>
+        <a:ext cx="841061" cy="840959"/>
       </dsp:txXfrm>
     </dsp:sp>
     <dsp:sp modelId="{867564D6-4CBC-4E74-868E-75914939A563}">
@@ -3613,8 +3627,8 @@
       </dsp:nvSpPr>
       <dsp:spPr>
         <a:xfrm>
-          <a:off x="1993268" y="3461912"/>
-          <a:ext cx="331994" cy="332093"/>
+          <a:off x="2039969" y="3742427"/>
+          <a:ext cx="339772" cy="339874"/>
         </a:xfrm>
         <a:prstGeom prst="ellipse">
           <a:avLst/>
@@ -3664,8 +3678,8 @@
       </dsp:nvSpPr>
       <dsp:spPr>
         <a:xfrm>
-          <a:off x="7486756" y="1503031"/>
-          <a:ext cx="2026569" cy="2026203"/>
+          <a:off x="7662166" y="1737651"/>
+          <a:ext cx="2074050" cy="2073675"/>
         </a:xfrm>
         <a:prstGeom prst="ellipse">
           <a:avLst/>
@@ -3707,12 +3721,12 @@
         </a:fontRef>
       </dsp:style>
       <dsp:txBody>
-        <a:bodyPr spcFirstLastPara="0" vert="horz" wrap="square" lIns="83820" tIns="83820" rIns="83820" bIns="83820" numCol="1" spcCol="1270" anchor="ctr" anchorCtr="0">
+        <a:bodyPr spcFirstLastPara="0" vert="horz" wrap="square" lIns="87630" tIns="87630" rIns="87630" bIns="87630" numCol="1" spcCol="1270" anchor="ctr" anchorCtr="0">
           <a:noAutofit/>
         </a:bodyPr>
         <a:lstStyle/>
         <a:p>
-          <a:pPr lvl="0" algn="ctr" defTabSz="977900">
+          <a:pPr lvl="0" algn="ctr" defTabSz="1022350">
             <a:lnSpc>
               <a:spcPct val="90000"/>
             </a:lnSpc>
@@ -3724,15 +3738,15 @@
             </a:spcAft>
           </a:pPr>
           <a:r>
-            <a:rPr lang="en-US" sz="2200" kern="1200" dirty="0" smtClean="0"/>
+            <a:rPr lang="en-US" sz="2300" kern="1200" dirty="0" smtClean="0"/>
             <a:t>Plots (Plotly, D3, D3-Cloud)</a:t>
           </a:r>
-          <a:endParaRPr lang="en-US" sz="2200" kern="1200" dirty="0"/>
+          <a:endParaRPr lang="en-US" sz="2300" kern="1200" dirty="0"/>
         </a:p>
       </dsp:txBody>
       <dsp:txXfrm>
-        <a:off x="7783540" y="1799762"/>
-        <a:ext cx="1433001" cy="1432741"/>
+        <a:off x="7965904" y="2041334"/>
+        <a:ext cx="1466574" cy="1466309"/>
       </dsp:txXfrm>
     </dsp:sp>
     <dsp:sp modelId="{7F8286A3-6B65-4F08-B8CE-5A1952659120}">
@@ -3742,8 +3756,8 @@
       </dsp:nvSpPr>
       <dsp:spPr>
         <a:xfrm>
-          <a:off x="652072" y="3799939"/>
-          <a:ext cx="2634540" cy="694189"/>
+          <a:off x="667350" y="4088373"/>
+          <a:ext cx="2696265" cy="710454"/>
         </a:xfrm>
         <a:prstGeom prst="rect">
           <a:avLst/>
@@ -3791,8 +3805,8 @@
         </a:p>
       </dsp:txBody>
       <dsp:txXfrm>
-        <a:off x="652072" y="3799939"/>
-        <a:ext cx="2634540" cy="694189"/>
+        <a:off x="667350" y="4088373"/>
+        <a:ext cx="2696265" cy="710454"/>
       </dsp:txXfrm>
     </dsp:sp>
   </dsp:spTree>
@@ -10521,14 +10535,14 @@
             <p:ph idx="1"/>
             <p:extLst>
               <p:ext uri="{D42A27DB-BD31-4B8C-83A1-F6EECF244321}">
-                <p14:modId xmlns:p14="http://schemas.microsoft.com/office/powerpoint/2010/main" val="1877743070"/>
+                <p14:modId xmlns:p14="http://schemas.microsoft.com/office/powerpoint/2010/main" val="3108507049"/>
               </p:ext>
             </p:extLst>
           </p:nvPr>
         </p:nvGraphicFramePr>
         <p:xfrm>
-          <a:off x="853440" y="792481"/>
-          <a:ext cx="10500360" cy="5279980"/>
+          <a:off x="1193073" y="269966"/>
+          <a:ext cx="10746377" cy="5802495"/>
         </p:xfrm>
         <a:graphic>
           <a:graphicData uri="http://schemas.openxmlformats.org/drawingml/2006/diagram">

</xml_diff>